<commit_message>
Class Design |doc | Subject 내용 추가
</commit_message>
<xml_diff>
--- a/doc/3_ 설계서/Class Design.pptx
+++ b/doc/3_ 설계서/Class Design.pptx
@@ -1137,10 +1137,34 @@
             <a:tbl>
               <a:tblPr/>
               <a:tblGrid>
-                <a:gridCol w="1022523"/>
-                <a:gridCol w="3439486"/>
-                <a:gridCol w="947956"/>
-                <a:gridCol w="3523377"/>
+                <a:gridCol w="1022523">
+                  <a:extLst>
+                    <a:ext uri="{9D8B030D-6E8A-4147-A177-3AD203B41FA5}">
+                      <a16:colId xmlns:a16="http://schemas.microsoft.com/office/drawing/2014/main" val="20000"/>
+                    </a:ext>
+                  </a:extLst>
+                </a:gridCol>
+                <a:gridCol w="3439486">
+                  <a:extLst>
+                    <a:ext uri="{9D8B030D-6E8A-4147-A177-3AD203B41FA5}">
+                      <a16:colId xmlns:a16="http://schemas.microsoft.com/office/drawing/2014/main" val="20001"/>
+                    </a:ext>
+                  </a:extLst>
+                </a:gridCol>
+                <a:gridCol w="947956">
+                  <a:extLst>
+                    <a:ext uri="{9D8B030D-6E8A-4147-A177-3AD203B41FA5}">
+                      <a16:colId xmlns:a16="http://schemas.microsoft.com/office/drawing/2014/main" val="20002"/>
+                    </a:ext>
+                  </a:extLst>
+                </a:gridCol>
+                <a:gridCol w="3523377">
+                  <a:extLst>
+                    <a:ext uri="{9D8B030D-6E8A-4147-A177-3AD203B41FA5}">
+                      <a16:colId xmlns:a16="http://schemas.microsoft.com/office/drawing/2014/main" val="20003"/>
+                    </a:ext>
+                  </a:extLst>
+                </a:gridCol>
               </a:tblGrid>
               <a:tr h="299619">
                 <a:tc rowSpan="2">
@@ -1523,6 +1547,11 @@
                     <a:noFill/>
                   </a:tcPr>
                 </a:tc>
+                <a:extLst>
+                  <a:ext uri="{0D108BD9-81ED-4DB2-BD59-A6C34878D82A}">
+                    <a16:rowId xmlns:a16="http://schemas.microsoft.com/office/drawing/2014/main" val="10000"/>
+                  </a:ext>
+                </a:extLst>
               </a:tr>
               <a:tr h="297106">
                 <a:tc vMerge="1">
@@ -1877,6 +1906,11 @@
                     <a:noFill/>
                   </a:tcPr>
                 </a:tc>
+                <a:extLst>
+                  <a:ext uri="{0D108BD9-81ED-4DB2-BD59-A6C34878D82A}">
+                    <a16:rowId xmlns:a16="http://schemas.microsoft.com/office/drawing/2014/main" val="10001"/>
+                  </a:ext>
+                </a:extLst>
               </a:tr>
             </a:tbl>
           </a:graphicData>
@@ -2308,10 +2342,34 @@
             <a:tbl>
               <a:tblPr/>
               <a:tblGrid>
-                <a:gridCol w="1022523"/>
-                <a:gridCol w="3439486"/>
-                <a:gridCol w="947956"/>
-                <a:gridCol w="3523377"/>
+                <a:gridCol w="1022523">
+                  <a:extLst>
+                    <a:ext uri="{9D8B030D-6E8A-4147-A177-3AD203B41FA5}">
+                      <a16:colId xmlns:a16="http://schemas.microsoft.com/office/drawing/2014/main" val="20000"/>
+                    </a:ext>
+                  </a:extLst>
+                </a:gridCol>
+                <a:gridCol w="3439486">
+                  <a:extLst>
+                    <a:ext uri="{9D8B030D-6E8A-4147-A177-3AD203B41FA5}">
+                      <a16:colId xmlns:a16="http://schemas.microsoft.com/office/drawing/2014/main" val="20001"/>
+                    </a:ext>
+                  </a:extLst>
+                </a:gridCol>
+                <a:gridCol w="947956">
+                  <a:extLst>
+                    <a:ext uri="{9D8B030D-6E8A-4147-A177-3AD203B41FA5}">
+                      <a16:colId xmlns:a16="http://schemas.microsoft.com/office/drawing/2014/main" val="20002"/>
+                    </a:ext>
+                  </a:extLst>
+                </a:gridCol>
+                <a:gridCol w="3523377">
+                  <a:extLst>
+                    <a:ext uri="{9D8B030D-6E8A-4147-A177-3AD203B41FA5}">
+                      <a16:colId xmlns:a16="http://schemas.microsoft.com/office/drawing/2014/main" val="20003"/>
+                    </a:ext>
+                  </a:extLst>
+                </a:gridCol>
               </a:tblGrid>
               <a:tr h="299619">
                 <a:tc rowSpan="2">
@@ -2726,6 +2784,11 @@
                     <a:noFill/>
                   </a:tcPr>
                 </a:tc>
+                <a:extLst>
+                  <a:ext uri="{0D108BD9-81ED-4DB2-BD59-A6C34878D82A}">
+                    <a16:rowId xmlns:a16="http://schemas.microsoft.com/office/drawing/2014/main" val="10000"/>
+                  </a:ext>
+                </a:extLst>
               </a:tr>
               <a:tr h="297106">
                 <a:tc vMerge="1">
@@ -3088,6 +3151,11 @@
                     <a:noFill/>
                   </a:tcPr>
                 </a:tc>
+                <a:extLst>
+                  <a:ext uri="{0D108BD9-81ED-4DB2-BD59-A6C34878D82A}">
+                    <a16:rowId xmlns:a16="http://schemas.microsoft.com/office/drawing/2014/main" val="10001"/>
+                  </a:ext>
+                </a:extLst>
               </a:tr>
             </a:tbl>
           </a:graphicData>
@@ -4088,7 +4156,13 @@
                 <a:tableStyleId>{5940675A-B579-460E-94D1-54222C63F5DA}</a:tableStyleId>
               </a:tblPr>
               <a:tblGrid>
-                <a:gridCol w="7556500"/>
+                <a:gridCol w="7556500">
+                  <a:extLst>
+                    <a:ext uri="{9D8B030D-6E8A-4147-A177-3AD203B41FA5}">
+                      <a16:colId xmlns:a16="http://schemas.microsoft.com/office/drawing/2014/main" val="20000"/>
+                    </a:ext>
+                  </a:extLst>
+                </a:gridCol>
               </a:tblGrid>
               <a:tr h="342902">
                 <a:tc>
@@ -4137,6 +4211,11 @@
                   </a:txBody>
                   <a:tcPr/>
                 </a:tc>
+                <a:extLst>
+                  <a:ext uri="{0D108BD9-81ED-4DB2-BD59-A6C34878D82A}">
+                    <a16:rowId xmlns:a16="http://schemas.microsoft.com/office/drawing/2014/main" val="10000"/>
+                  </a:ext>
+                </a:extLst>
               </a:tr>
               <a:tr h="2290108">
                 <a:tc>
@@ -4153,6 +4232,11 @@
                   </a:txBody>
                   <a:tcPr/>
                 </a:tc>
+                <a:extLst>
+                  <a:ext uri="{0D108BD9-81ED-4DB2-BD59-A6C34878D82A}">
+                    <a16:rowId xmlns:a16="http://schemas.microsoft.com/office/drawing/2014/main" val="10001"/>
+                  </a:ext>
+                </a:extLst>
               </a:tr>
               <a:tr h="2290108">
                 <a:tc>
@@ -4186,6 +4270,11 @@
                   </a:txBody>
                   <a:tcPr/>
                 </a:tc>
+                <a:extLst>
+                  <a:ext uri="{0D108BD9-81ED-4DB2-BD59-A6C34878D82A}">
+                    <a16:rowId xmlns:a16="http://schemas.microsoft.com/office/drawing/2014/main" val="10002"/>
+                  </a:ext>
+                </a:extLst>
               </a:tr>
             </a:tbl>
           </a:graphicData>
@@ -4265,7 +4354,13 @@
                 <a:tableStyleId>{5940675A-B579-460E-94D1-54222C63F5DA}</a:tableStyleId>
               </a:tblPr>
               <a:tblGrid>
-                <a:gridCol w="7556500"/>
+                <a:gridCol w="7556500">
+                  <a:extLst>
+                    <a:ext uri="{9D8B030D-6E8A-4147-A177-3AD203B41FA5}">
+                      <a16:colId xmlns:a16="http://schemas.microsoft.com/office/drawing/2014/main" val="20000"/>
+                    </a:ext>
+                  </a:extLst>
+                </a:gridCol>
               </a:tblGrid>
               <a:tr h="342902">
                 <a:tc>
@@ -4298,6 +4393,11 @@
                   </a:txBody>
                   <a:tcPr/>
                 </a:tc>
+                <a:extLst>
+                  <a:ext uri="{0D108BD9-81ED-4DB2-BD59-A6C34878D82A}">
+                    <a16:rowId xmlns:a16="http://schemas.microsoft.com/office/drawing/2014/main" val="10000"/>
+                  </a:ext>
+                </a:extLst>
               </a:tr>
               <a:tr h="2290108">
                 <a:tc>
@@ -4314,6 +4414,11 @@
                   </a:txBody>
                   <a:tcPr/>
                 </a:tc>
+                <a:extLst>
+                  <a:ext uri="{0D108BD9-81ED-4DB2-BD59-A6C34878D82A}">
+                    <a16:rowId xmlns:a16="http://schemas.microsoft.com/office/drawing/2014/main" val="10001"/>
+                  </a:ext>
+                </a:extLst>
               </a:tr>
               <a:tr h="2290108">
                 <a:tc>
@@ -4347,6 +4452,11 @@
                   </a:txBody>
                   <a:tcPr/>
                 </a:tc>
+                <a:extLst>
+                  <a:ext uri="{0D108BD9-81ED-4DB2-BD59-A6C34878D82A}">
+                    <a16:rowId xmlns:a16="http://schemas.microsoft.com/office/drawing/2014/main" val="10002"/>
+                  </a:ext>
+                </a:extLst>
               </a:tr>
             </a:tbl>
           </a:graphicData>
@@ -4426,7 +4536,13 @@
                 <a:tableStyleId>{5940675A-B579-460E-94D1-54222C63F5DA}</a:tableStyleId>
               </a:tblPr>
               <a:tblGrid>
-                <a:gridCol w="7556500"/>
+                <a:gridCol w="7556500">
+                  <a:extLst>
+                    <a:ext uri="{9D8B030D-6E8A-4147-A177-3AD203B41FA5}">
+                      <a16:colId xmlns:a16="http://schemas.microsoft.com/office/drawing/2014/main" val="20000"/>
+                    </a:ext>
+                  </a:extLst>
+                </a:gridCol>
               </a:tblGrid>
               <a:tr h="342902">
                 <a:tc>
@@ -4451,6 +4567,11 @@
                   </a:txBody>
                   <a:tcPr/>
                 </a:tc>
+                <a:extLst>
+                  <a:ext uri="{0D108BD9-81ED-4DB2-BD59-A6C34878D82A}">
+                    <a16:rowId xmlns:a16="http://schemas.microsoft.com/office/drawing/2014/main" val="10000"/>
+                  </a:ext>
+                </a:extLst>
               </a:tr>
               <a:tr h="2290108">
                 <a:tc>
@@ -4467,6 +4588,11 @@
                   </a:txBody>
                   <a:tcPr/>
                 </a:tc>
+                <a:extLst>
+                  <a:ext uri="{0D108BD9-81ED-4DB2-BD59-A6C34878D82A}">
+                    <a16:rowId xmlns:a16="http://schemas.microsoft.com/office/drawing/2014/main" val="10001"/>
+                  </a:ext>
+                </a:extLst>
               </a:tr>
               <a:tr h="2290108">
                 <a:tc>
@@ -4500,6 +4626,11 @@
                   </a:txBody>
                   <a:tcPr/>
                 </a:tc>
+                <a:extLst>
+                  <a:ext uri="{0D108BD9-81ED-4DB2-BD59-A6C34878D82A}">
+                    <a16:rowId xmlns:a16="http://schemas.microsoft.com/office/drawing/2014/main" val="10002"/>
+                  </a:ext>
+                </a:extLst>
               </a:tr>
             </a:tbl>
           </a:graphicData>
@@ -4565,7 +4696,11 @@
             <a:graphicFrameLocks noGrp="1"/>
           </p:cNvGraphicFramePr>
           <p:nvPr>
-            <p:extLst/>
+            <p:extLst>
+              <p:ext uri="{D42A27DB-BD31-4B8C-83A1-F6EECF244321}">
+                <p14:modId xmlns:p14="http://schemas.microsoft.com/office/powerpoint/2010/main" val="2471926084"/>
+              </p:ext>
+            </p:extLst>
           </p:nvPr>
         </p:nvGraphicFramePr>
         <p:xfrm>
@@ -4579,7 +4714,13 @@
                 <a:tableStyleId>{5940675A-B579-460E-94D1-54222C63F5DA}</a:tableStyleId>
               </a:tblPr>
               <a:tblGrid>
-                <a:gridCol w="7556500"/>
+                <a:gridCol w="7556500">
+                  <a:extLst>
+                    <a:ext uri="{9D8B030D-6E8A-4147-A177-3AD203B41FA5}">
+                      <a16:colId xmlns:a16="http://schemas.microsoft.com/office/drawing/2014/main" val="20000"/>
+                    </a:ext>
+                  </a:extLst>
+                </a:gridCol>
               </a:tblGrid>
               <a:tr h="342902">
                 <a:tc>
@@ -4604,6 +4745,11 @@
                   </a:txBody>
                   <a:tcPr/>
                 </a:tc>
+                <a:extLst>
+                  <a:ext uri="{0D108BD9-81ED-4DB2-BD59-A6C34878D82A}">
+                    <a16:rowId xmlns:a16="http://schemas.microsoft.com/office/drawing/2014/main" val="10000"/>
+                  </a:ext>
+                </a:extLst>
               </a:tr>
               <a:tr h="2290108">
                 <a:tc>
@@ -4611,15 +4757,221 @@
                     <a:bodyPr/>
                     <a:lstStyle/>
                     <a:p>
+                      <a:r>
+                        <a:rPr lang="en-US" sz="1200" dirty="0" smtClean="0">
+                          <a:latin typeface="Malgun Gothic" charset="-127"/>
+                          <a:ea typeface="Malgun Gothic" charset="-127"/>
+                          <a:cs typeface="Malgun Gothic" charset="-127"/>
+                        </a:rPr>
+                        <a:t>public String name</a:t>
+                      </a:r>
+                    </a:p>
+                    <a:p>
+                      <a:r>
+                        <a:rPr lang="en-US" sz="1200" dirty="0" smtClean="0">
+                          <a:latin typeface="Malgun Gothic" charset="-127"/>
+                          <a:ea typeface="Malgun Gothic" charset="-127"/>
+                          <a:cs typeface="Malgun Gothic" charset="-127"/>
+                        </a:rPr>
+                        <a:t>public String prof</a:t>
+                      </a:r>
+                    </a:p>
+                    <a:p>
+                      <a:r>
+                        <a:rPr lang="en-US" sz="1200" dirty="0" smtClean="0">
+                          <a:latin typeface="Malgun Gothic" charset="-127"/>
+                          <a:ea typeface="Malgun Gothic" charset="-127"/>
+                          <a:cs typeface="Malgun Gothic" charset="-127"/>
+                        </a:rPr>
+                        <a:t>public String </a:t>
+                      </a:r>
+                      <a:r>
+                        <a:rPr lang="en-US" sz="1200" dirty="0" err="1" smtClean="0">
+                          <a:latin typeface="Malgun Gothic" charset="-127"/>
+                          <a:ea typeface="Malgun Gothic" charset="-127"/>
+                          <a:cs typeface="Malgun Gothic" charset="-127"/>
+                        </a:rPr>
+                        <a:t>selectday</a:t>
+                      </a:r>
                       <a:endParaRPr lang="en-US" sz="1200" dirty="0" smtClean="0">
                         <a:latin typeface="Malgun Gothic" charset="-127"/>
                         <a:ea typeface="Malgun Gothic" charset="-127"/>
                         <a:cs typeface="Malgun Gothic" charset="-127"/>
                       </a:endParaRPr>
                     </a:p>
+                    <a:p>
+                      <a:r>
+                        <a:rPr lang="en-US" sz="1200" dirty="0" smtClean="0">
+                          <a:latin typeface="Malgun Gothic" charset="-127"/>
+                          <a:ea typeface="Malgun Gothic" charset="-127"/>
+                          <a:cs typeface="Malgun Gothic" charset="-127"/>
+                        </a:rPr>
+                        <a:t>public </a:t>
+                      </a:r>
+                      <a:r>
+                        <a:rPr lang="en-US" sz="1200" dirty="0" err="1" smtClean="0">
+                          <a:latin typeface="Malgun Gothic" charset="-127"/>
+                          <a:ea typeface="Malgun Gothic" charset="-127"/>
+                          <a:cs typeface="Malgun Gothic" charset="-127"/>
+                        </a:rPr>
+                        <a:t>int</a:t>
+                      </a:r>
+                      <a:r>
+                        <a:rPr lang="en-US" sz="1200" dirty="0" smtClean="0">
+                          <a:latin typeface="Malgun Gothic" charset="-127"/>
+                          <a:ea typeface="Malgun Gothic" charset="-127"/>
+                          <a:cs typeface="Malgun Gothic" charset="-127"/>
+                        </a:rPr>
+                        <a:t> </a:t>
+                      </a:r>
+                      <a:r>
+                        <a:rPr lang="en-US" sz="1200" dirty="0" err="1" smtClean="0">
+                          <a:latin typeface="Malgun Gothic" charset="-127"/>
+                          <a:ea typeface="Malgun Gothic" charset="-127"/>
+                          <a:cs typeface="Malgun Gothic" charset="-127"/>
+                        </a:rPr>
+                        <a:t>starthour</a:t>
+                      </a:r>
+                      <a:endParaRPr lang="en-US" sz="1200" dirty="0" smtClean="0">
+                        <a:latin typeface="Malgun Gothic" charset="-127"/>
+                        <a:ea typeface="Malgun Gothic" charset="-127"/>
+                        <a:cs typeface="Malgun Gothic" charset="-127"/>
+                      </a:endParaRPr>
+                    </a:p>
+                    <a:p>
+                      <a:r>
+                        <a:rPr lang="en-US" sz="1200" dirty="0" smtClean="0">
+                          <a:latin typeface="Malgun Gothic" charset="-127"/>
+                          <a:ea typeface="Malgun Gothic" charset="-127"/>
+                          <a:cs typeface="Malgun Gothic" charset="-127"/>
+                        </a:rPr>
+                        <a:t>public String </a:t>
+                      </a:r>
+                      <a:r>
+                        <a:rPr lang="en-US" sz="1200" dirty="0" err="1" smtClean="0">
+                          <a:latin typeface="Malgun Gothic" charset="-127"/>
+                          <a:ea typeface="Malgun Gothic" charset="-127"/>
+                          <a:cs typeface="Malgun Gothic" charset="-127"/>
+                        </a:rPr>
+                        <a:t>startminute</a:t>
+                      </a:r>
+                      <a:endParaRPr lang="en-US" sz="1200" dirty="0" smtClean="0">
+                        <a:latin typeface="Malgun Gothic" charset="-127"/>
+                        <a:ea typeface="Malgun Gothic" charset="-127"/>
+                        <a:cs typeface="Malgun Gothic" charset="-127"/>
+                      </a:endParaRPr>
+                    </a:p>
+                    <a:p>
+                      <a:r>
+                        <a:rPr lang="en-US" sz="1200" dirty="0" smtClean="0">
+                          <a:latin typeface="Malgun Gothic" charset="-127"/>
+                          <a:ea typeface="Malgun Gothic" charset="-127"/>
+                          <a:cs typeface="Malgun Gothic" charset="-127"/>
+                        </a:rPr>
+                        <a:t>public </a:t>
+                      </a:r>
+                      <a:r>
+                        <a:rPr lang="en-US" sz="1200" dirty="0" err="1" smtClean="0">
+                          <a:latin typeface="Malgun Gothic" charset="-127"/>
+                          <a:ea typeface="Malgun Gothic" charset="-127"/>
+                          <a:cs typeface="Malgun Gothic" charset="-127"/>
+                        </a:rPr>
+                        <a:t>int</a:t>
+                      </a:r>
+                      <a:r>
+                        <a:rPr lang="en-US" sz="1200" dirty="0" smtClean="0">
+                          <a:latin typeface="Malgun Gothic" charset="-127"/>
+                          <a:ea typeface="Malgun Gothic" charset="-127"/>
+                          <a:cs typeface="Malgun Gothic" charset="-127"/>
+                        </a:rPr>
+                        <a:t> </a:t>
+                      </a:r>
+                      <a:r>
+                        <a:rPr lang="en-US" sz="1200" dirty="0" err="1" smtClean="0">
+                          <a:latin typeface="Malgun Gothic" charset="-127"/>
+                          <a:ea typeface="Malgun Gothic" charset="-127"/>
+                          <a:cs typeface="Malgun Gothic" charset="-127"/>
+                        </a:rPr>
+                        <a:t>endhour</a:t>
+                      </a:r>
+                      <a:endParaRPr lang="en-US" sz="1200" dirty="0" smtClean="0">
+                        <a:latin typeface="Malgun Gothic" charset="-127"/>
+                        <a:ea typeface="Malgun Gothic" charset="-127"/>
+                        <a:cs typeface="Malgun Gothic" charset="-127"/>
+                      </a:endParaRPr>
+                    </a:p>
+                    <a:p>
+                      <a:r>
+                        <a:rPr lang="en-US" sz="1200" dirty="0" smtClean="0">
+                          <a:latin typeface="Malgun Gothic" charset="-127"/>
+                          <a:ea typeface="Malgun Gothic" charset="-127"/>
+                          <a:cs typeface="Malgun Gothic" charset="-127"/>
+                        </a:rPr>
+                        <a:t>public String </a:t>
+                      </a:r>
+                      <a:r>
+                        <a:rPr lang="en-US" sz="1200" dirty="0" err="1" smtClean="0">
+                          <a:latin typeface="Malgun Gothic" charset="-127"/>
+                          <a:ea typeface="Malgun Gothic" charset="-127"/>
+                          <a:cs typeface="Malgun Gothic" charset="-127"/>
+                        </a:rPr>
+                        <a:t>endminute</a:t>
+                      </a:r>
+                      <a:endParaRPr lang="en-US" sz="1200" dirty="0" smtClean="0">
+                        <a:latin typeface="Malgun Gothic" charset="-127"/>
+                        <a:ea typeface="Malgun Gothic" charset="-127"/>
+                        <a:cs typeface="Malgun Gothic" charset="-127"/>
+                      </a:endParaRPr>
+                    </a:p>
+                    <a:p>
+                      <a:r>
+                        <a:rPr lang="en-US" sz="1200" dirty="0" smtClean="0">
+                          <a:latin typeface="Malgun Gothic" charset="-127"/>
+                          <a:ea typeface="Malgun Gothic" charset="-127"/>
+                          <a:cs typeface="Malgun Gothic" charset="-127"/>
+                        </a:rPr>
+                        <a:t>public </a:t>
+                      </a:r>
+                      <a:r>
+                        <a:rPr lang="en-US" sz="1200" dirty="0" err="1" smtClean="0">
+                          <a:latin typeface="Malgun Gothic" charset="-127"/>
+                          <a:ea typeface="Malgun Gothic" charset="-127"/>
+                          <a:cs typeface="Malgun Gothic" charset="-127"/>
+                        </a:rPr>
+                        <a:t>int</a:t>
+                      </a:r>
+                      <a:r>
+                        <a:rPr lang="en-US" sz="1200" dirty="0" smtClean="0">
+                          <a:latin typeface="Malgun Gothic" charset="-127"/>
+                          <a:ea typeface="Malgun Gothic" charset="-127"/>
+                          <a:cs typeface="Malgun Gothic" charset="-127"/>
+                        </a:rPr>
+                        <a:t> year</a:t>
+                      </a:r>
+                    </a:p>
+                    <a:p>
+                      <a:r>
+                        <a:rPr lang="en-US" sz="1200" dirty="0" smtClean="0">
+                          <a:latin typeface="Malgun Gothic" charset="-127"/>
+                          <a:ea typeface="Malgun Gothic" charset="-127"/>
+                          <a:cs typeface="Malgun Gothic" charset="-127"/>
+                        </a:rPr>
+                        <a:t>public String semester</a:t>
+                      </a:r>
+                      <a:endParaRPr lang="en-US" sz="1200" dirty="0" smtClean="0">
+                        <a:latin typeface="Malgun Gothic" charset="-127"/>
+                        <a:ea typeface="Malgun Gothic" charset="-127"/>
+                        <a:cs typeface="Malgun Gothic" charset="-127"/>
+                      </a:endParaRPr>
+                    </a:p>
                   </a:txBody>
                   <a:tcPr/>
                 </a:tc>
+                <a:extLst>
+                  <a:ext uri="{0D108BD9-81ED-4DB2-BD59-A6C34878D82A}">
+                    <a16:rowId xmlns:a16="http://schemas.microsoft.com/office/drawing/2014/main" val="10001"/>
+                  </a:ext>
+                </a:extLst>
               </a:tr>
               <a:tr h="2290108">
                 <a:tc>
@@ -4644,6 +4996,169 @@
                         <a:tabLst/>
                         <a:defRPr/>
                       </a:pPr>
+                      <a:r>
+                        <a:rPr lang="en-US" sz="1200" baseline="0" dirty="0" smtClean="0">
+                          <a:latin typeface="Malgun Gothic" charset="-127"/>
+                          <a:ea typeface="Malgun Gothic" charset="-127"/>
+                          <a:cs typeface="Malgun Gothic" charset="-127"/>
+                        </a:rPr>
+                        <a:t>public Subject(String name, String prof, String </a:t>
+                      </a:r>
+                      <a:r>
+                        <a:rPr lang="en-US" sz="1200" baseline="0" dirty="0" err="1" smtClean="0">
+                          <a:latin typeface="Malgun Gothic" charset="-127"/>
+                          <a:ea typeface="Malgun Gothic" charset="-127"/>
+                          <a:cs typeface="Malgun Gothic" charset="-127"/>
+                        </a:rPr>
+                        <a:t>selectDay</a:t>
+                      </a:r>
+                      <a:r>
+                        <a:rPr lang="en-US" sz="1200" baseline="0" dirty="0" smtClean="0">
+                          <a:latin typeface="Malgun Gothic" charset="-127"/>
+                          <a:ea typeface="Malgun Gothic" charset="-127"/>
+                          <a:cs typeface="Malgun Gothic" charset="-127"/>
+                        </a:rPr>
+                        <a:t>, </a:t>
+                      </a:r>
+                      <a:r>
+                        <a:rPr lang="en-US" sz="1200" baseline="0" dirty="0" err="1" smtClean="0">
+                          <a:latin typeface="Malgun Gothic" charset="-127"/>
+                          <a:ea typeface="Malgun Gothic" charset="-127"/>
+                          <a:cs typeface="Malgun Gothic" charset="-127"/>
+                        </a:rPr>
+                        <a:t>int</a:t>
+                      </a:r>
+                      <a:r>
+                        <a:rPr lang="en-US" sz="1200" baseline="0" dirty="0" smtClean="0">
+                          <a:latin typeface="Malgun Gothic" charset="-127"/>
+                          <a:ea typeface="Malgun Gothic" charset="-127"/>
+                          <a:cs typeface="Malgun Gothic" charset="-127"/>
+                        </a:rPr>
+                        <a:t> </a:t>
+                      </a:r>
+                      <a:r>
+                        <a:rPr lang="en-US" sz="1200" baseline="0" dirty="0" err="1" smtClean="0">
+                          <a:latin typeface="Malgun Gothic" charset="-127"/>
+                          <a:ea typeface="Malgun Gothic" charset="-127"/>
+                          <a:cs typeface="Malgun Gothic" charset="-127"/>
+                        </a:rPr>
+                        <a:t>startHour</a:t>
+                      </a:r>
+                      <a:r>
+                        <a:rPr lang="en-US" sz="1200" baseline="0" dirty="0" smtClean="0">
+                          <a:latin typeface="Malgun Gothic" charset="-127"/>
+                          <a:ea typeface="Malgun Gothic" charset="-127"/>
+                          <a:cs typeface="Malgun Gothic" charset="-127"/>
+                        </a:rPr>
+                        <a:t>, String </a:t>
+                      </a:r>
+                      <a:r>
+                        <a:rPr lang="en-US" sz="1200" baseline="0" dirty="0" err="1" smtClean="0">
+                          <a:latin typeface="Malgun Gothic" charset="-127"/>
+                          <a:ea typeface="Malgun Gothic" charset="-127"/>
+                          <a:cs typeface="Malgun Gothic" charset="-127"/>
+                        </a:rPr>
+                        <a:t>startMinute</a:t>
+                      </a:r>
+                      <a:r>
+                        <a:rPr lang="en-US" sz="1200" baseline="0" dirty="0" smtClean="0">
+                          <a:latin typeface="Malgun Gothic" charset="-127"/>
+                          <a:ea typeface="Malgun Gothic" charset="-127"/>
+                          <a:cs typeface="Malgun Gothic" charset="-127"/>
+                        </a:rPr>
+                        <a:t>, </a:t>
+                      </a:r>
+                      <a:r>
+                        <a:rPr lang="en-US" sz="1200" baseline="0" dirty="0" err="1" smtClean="0">
+                          <a:latin typeface="Malgun Gothic" charset="-127"/>
+                          <a:ea typeface="Malgun Gothic" charset="-127"/>
+                          <a:cs typeface="Malgun Gothic" charset="-127"/>
+                        </a:rPr>
+                        <a:t>int</a:t>
+                      </a:r>
+                      <a:r>
+                        <a:rPr lang="en-US" sz="1200" baseline="0" dirty="0" smtClean="0">
+                          <a:latin typeface="Malgun Gothic" charset="-127"/>
+                          <a:ea typeface="Malgun Gothic" charset="-127"/>
+                          <a:cs typeface="Malgun Gothic" charset="-127"/>
+                        </a:rPr>
+                        <a:t> </a:t>
+                      </a:r>
+                      <a:r>
+                        <a:rPr lang="en-US" sz="1200" baseline="0" dirty="0" err="1" smtClean="0">
+                          <a:latin typeface="Malgun Gothic" charset="-127"/>
+                          <a:ea typeface="Malgun Gothic" charset="-127"/>
+                          <a:cs typeface="Malgun Gothic" charset="-127"/>
+                        </a:rPr>
+                        <a:t>endHour</a:t>
+                      </a:r>
+                      <a:r>
+                        <a:rPr lang="en-US" sz="1200" baseline="0" dirty="0" smtClean="0">
+                          <a:latin typeface="Malgun Gothic" charset="-127"/>
+                          <a:ea typeface="Malgun Gothic" charset="-127"/>
+                          <a:cs typeface="Malgun Gothic" charset="-127"/>
+                        </a:rPr>
+                        <a:t>,</a:t>
+                      </a:r>
+                    </a:p>
+                    <a:p>
+                      <a:pPr marL="0" marR="0" indent="0" algn="l" defTabSz="914400" rtl="0" eaLnBrk="1" fontAlgn="auto" latinLnBrk="1" hangingPunct="1">
+                        <a:lnSpc>
+                          <a:spcPct val="100000"/>
+                        </a:lnSpc>
+                        <a:spcBef>
+                          <a:spcPts val="0"/>
+                        </a:spcBef>
+                        <a:spcAft>
+                          <a:spcPts val="0"/>
+                        </a:spcAft>
+                        <a:buClrTx/>
+                        <a:buSzTx/>
+                        <a:buFontTx/>
+                        <a:buNone/>
+                        <a:tabLst/>
+                        <a:defRPr/>
+                      </a:pPr>
+                      <a:r>
+                        <a:rPr lang="en-US" sz="1200" baseline="0" dirty="0" smtClean="0">
+                          <a:latin typeface="Malgun Gothic" charset="-127"/>
+                          <a:ea typeface="Malgun Gothic" charset="-127"/>
+                          <a:cs typeface="Malgun Gothic" charset="-127"/>
+                        </a:rPr>
+                        <a:t>                    String </a:t>
+                      </a:r>
+                      <a:r>
+                        <a:rPr lang="en-US" sz="1200" baseline="0" dirty="0" err="1" smtClean="0">
+                          <a:latin typeface="Malgun Gothic" charset="-127"/>
+                          <a:ea typeface="Malgun Gothic" charset="-127"/>
+                          <a:cs typeface="Malgun Gothic" charset="-127"/>
+                        </a:rPr>
+                        <a:t>endMinute</a:t>
+                      </a:r>
+                      <a:r>
+                        <a:rPr lang="en-US" sz="1200" baseline="0" dirty="0" smtClean="0">
+                          <a:latin typeface="Malgun Gothic" charset="-127"/>
+                          <a:ea typeface="Malgun Gothic" charset="-127"/>
+                          <a:cs typeface="Malgun Gothic" charset="-127"/>
+                        </a:rPr>
+                        <a:t>, </a:t>
+                      </a:r>
+                      <a:r>
+                        <a:rPr lang="en-US" sz="1200" baseline="0" dirty="0" err="1" smtClean="0">
+                          <a:latin typeface="Malgun Gothic" charset="-127"/>
+                          <a:ea typeface="Malgun Gothic" charset="-127"/>
+                          <a:cs typeface="Malgun Gothic" charset="-127"/>
+                        </a:rPr>
+                        <a:t>int</a:t>
+                      </a:r>
+                      <a:r>
+                        <a:rPr lang="en-US" sz="1200" baseline="0" dirty="0" smtClean="0">
+                          <a:latin typeface="Malgun Gothic" charset="-127"/>
+                          <a:ea typeface="Malgun Gothic" charset="-127"/>
+                          <a:cs typeface="Malgun Gothic" charset="-127"/>
+                        </a:rPr>
+                        <a:t> year, String semester)</a:t>
+                      </a:r>
                       <a:endParaRPr lang="en-US" sz="1200" baseline="0" dirty="0" smtClean="0">
                         <a:latin typeface="Malgun Gothic" charset="-127"/>
                         <a:ea typeface="Malgun Gothic" charset="-127"/>
@@ -4653,6 +5168,11 @@
                   </a:txBody>
                   <a:tcPr/>
                 </a:tc>
+                <a:extLst>
+                  <a:ext uri="{0D108BD9-81ED-4DB2-BD59-A6C34878D82A}">
+                    <a16:rowId xmlns:a16="http://schemas.microsoft.com/office/drawing/2014/main" val="10002"/>
+                  </a:ext>
+                </a:extLst>
               </a:tr>
             </a:tbl>
           </a:graphicData>
@@ -4732,7 +5252,13 @@
                 <a:tableStyleId>{5940675A-B579-460E-94D1-54222C63F5DA}</a:tableStyleId>
               </a:tblPr>
               <a:tblGrid>
-                <a:gridCol w="7556500"/>
+                <a:gridCol w="7556500">
+                  <a:extLst>
+                    <a:ext uri="{9D8B030D-6E8A-4147-A177-3AD203B41FA5}">
+                      <a16:colId xmlns:a16="http://schemas.microsoft.com/office/drawing/2014/main" val="20000"/>
+                    </a:ext>
+                  </a:extLst>
+                </a:gridCol>
               </a:tblGrid>
               <a:tr h="342902">
                 <a:tc>
@@ -4765,6 +5291,11 @@
                   </a:txBody>
                   <a:tcPr/>
                 </a:tc>
+                <a:extLst>
+                  <a:ext uri="{0D108BD9-81ED-4DB2-BD59-A6C34878D82A}">
+                    <a16:rowId xmlns:a16="http://schemas.microsoft.com/office/drawing/2014/main" val="10000"/>
+                  </a:ext>
+                </a:extLst>
               </a:tr>
               <a:tr h="2290108">
                 <a:tc>
@@ -4781,6 +5312,11 @@
                   </a:txBody>
                   <a:tcPr/>
                 </a:tc>
+                <a:extLst>
+                  <a:ext uri="{0D108BD9-81ED-4DB2-BD59-A6C34878D82A}">
+                    <a16:rowId xmlns:a16="http://schemas.microsoft.com/office/drawing/2014/main" val="10001"/>
+                  </a:ext>
+                </a:extLst>
               </a:tr>
               <a:tr h="2290108">
                 <a:tc>
@@ -4814,6 +5350,11 @@
                   </a:txBody>
                   <a:tcPr/>
                 </a:tc>
+                <a:extLst>
+                  <a:ext uri="{0D108BD9-81ED-4DB2-BD59-A6C34878D82A}">
+                    <a16:rowId xmlns:a16="http://schemas.microsoft.com/office/drawing/2014/main" val="10002"/>
+                  </a:ext>
+                </a:extLst>
               </a:tr>
             </a:tbl>
           </a:graphicData>
@@ -4893,7 +5434,13 @@
                 <a:tableStyleId>{5940675A-B579-460E-94D1-54222C63F5DA}</a:tableStyleId>
               </a:tblPr>
               <a:tblGrid>
-                <a:gridCol w="7556500"/>
+                <a:gridCol w="7556500">
+                  <a:extLst>
+                    <a:ext uri="{9D8B030D-6E8A-4147-A177-3AD203B41FA5}">
+                      <a16:colId xmlns:a16="http://schemas.microsoft.com/office/drawing/2014/main" val="20000"/>
+                    </a:ext>
+                  </a:extLst>
+                </a:gridCol>
               </a:tblGrid>
               <a:tr h="342902">
                 <a:tc>
@@ -4918,6 +5465,11 @@
                   </a:txBody>
                   <a:tcPr/>
                 </a:tc>
+                <a:extLst>
+                  <a:ext uri="{0D108BD9-81ED-4DB2-BD59-A6C34878D82A}">
+                    <a16:rowId xmlns:a16="http://schemas.microsoft.com/office/drawing/2014/main" val="10000"/>
+                  </a:ext>
+                </a:extLst>
               </a:tr>
               <a:tr h="2290108">
                 <a:tc>
@@ -4934,6 +5486,11 @@
                   </a:txBody>
                   <a:tcPr/>
                 </a:tc>
+                <a:extLst>
+                  <a:ext uri="{0D108BD9-81ED-4DB2-BD59-A6C34878D82A}">
+                    <a16:rowId xmlns:a16="http://schemas.microsoft.com/office/drawing/2014/main" val="10001"/>
+                  </a:ext>
+                </a:extLst>
               </a:tr>
               <a:tr h="2290108">
                 <a:tc>
@@ -4967,6 +5524,11 @@
                   </a:txBody>
                   <a:tcPr/>
                 </a:tc>
+                <a:extLst>
+                  <a:ext uri="{0D108BD9-81ED-4DB2-BD59-A6C34878D82A}">
+                    <a16:rowId xmlns:a16="http://schemas.microsoft.com/office/drawing/2014/main" val="10002"/>
+                  </a:ext>
+                </a:extLst>
               </a:tr>
             </a:tbl>
           </a:graphicData>
@@ -5071,10 +5633,34 @@
                 <a:tableStyleId>{5940675A-B579-460E-94D1-54222C63F5DA}</a:tableStyleId>
               </a:tblPr>
               <a:tblGrid>
-                <a:gridCol w="2145506"/>
-                <a:gridCol w="2145506"/>
-                <a:gridCol w="2145506"/>
-                <a:gridCol w="2145506"/>
+                <a:gridCol w="2145506">
+                  <a:extLst>
+                    <a:ext uri="{9D8B030D-6E8A-4147-A177-3AD203B41FA5}">
+                      <a16:colId xmlns:a16="http://schemas.microsoft.com/office/drawing/2014/main" val="20000"/>
+                    </a:ext>
+                  </a:extLst>
+                </a:gridCol>
+                <a:gridCol w="2145506">
+                  <a:extLst>
+                    <a:ext uri="{9D8B030D-6E8A-4147-A177-3AD203B41FA5}">
+                      <a16:colId xmlns:a16="http://schemas.microsoft.com/office/drawing/2014/main" val="20001"/>
+                    </a:ext>
+                  </a:extLst>
+                </a:gridCol>
+                <a:gridCol w="2145506">
+                  <a:extLst>
+                    <a:ext uri="{9D8B030D-6E8A-4147-A177-3AD203B41FA5}">
+                      <a16:colId xmlns:a16="http://schemas.microsoft.com/office/drawing/2014/main" val="20002"/>
+                    </a:ext>
+                  </a:extLst>
+                </a:gridCol>
+                <a:gridCol w="2145506">
+                  <a:extLst>
+                    <a:ext uri="{9D8B030D-6E8A-4147-A177-3AD203B41FA5}">
+                      <a16:colId xmlns:a16="http://schemas.microsoft.com/office/drawing/2014/main" val="20003"/>
+                    </a:ext>
+                  </a:extLst>
+                </a:gridCol>
               </a:tblGrid>
               <a:tr h="370840">
                 <a:tc>
@@ -5197,6 +5783,11 @@
                     </a:solidFill>
                   </a:tcPr>
                 </a:tc>
+                <a:extLst>
+                  <a:ext uri="{0D108BD9-81ED-4DB2-BD59-A6C34878D82A}">
+                    <a16:rowId xmlns:a16="http://schemas.microsoft.com/office/drawing/2014/main" val="10000"/>
+                  </a:ext>
+                </a:extLst>
               </a:tr>
               <a:tr h="370840">
                 <a:tc>
@@ -5343,6 +5934,11 @@
                     </a:solidFill>
                   </a:tcPr>
                 </a:tc>
+                <a:extLst>
+                  <a:ext uri="{0D108BD9-81ED-4DB2-BD59-A6C34878D82A}">
+                    <a16:rowId xmlns:a16="http://schemas.microsoft.com/office/drawing/2014/main" val="10001"/>
+                  </a:ext>
+                </a:extLst>
               </a:tr>
               <a:tr h="370840">
                 <a:tc>
@@ -5429,6 +6025,11 @@
                     </a:solidFill>
                   </a:tcPr>
                 </a:tc>
+                <a:extLst>
+                  <a:ext uri="{0D108BD9-81ED-4DB2-BD59-A6C34878D82A}">
+                    <a16:rowId xmlns:a16="http://schemas.microsoft.com/office/drawing/2014/main" val="10002"/>
+                  </a:ext>
+                </a:extLst>
               </a:tr>
               <a:tr h="370840">
                 <a:tc>
@@ -5515,6 +6116,11 @@
                     </a:solidFill>
                   </a:tcPr>
                 </a:tc>
+                <a:extLst>
+                  <a:ext uri="{0D108BD9-81ED-4DB2-BD59-A6C34878D82A}">
+                    <a16:rowId xmlns:a16="http://schemas.microsoft.com/office/drawing/2014/main" val="10003"/>
+                  </a:ext>
+                </a:extLst>
               </a:tr>
               <a:tr h="370840">
                 <a:tc>
@@ -5601,6 +6207,11 @@
                     </a:solidFill>
                   </a:tcPr>
                 </a:tc>
+                <a:extLst>
+                  <a:ext uri="{0D108BD9-81ED-4DB2-BD59-A6C34878D82A}">
+                    <a16:rowId xmlns:a16="http://schemas.microsoft.com/office/drawing/2014/main" val="10004"/>
+                  </a:ext>
+                </a:extLst>
               </a:tr>
               <a:tr h="370840">
                 <a:tc>
@@ -5687,6 +6298,11 @@
                     </a:solidFill>
                   </a:tcPr>
                 </a:tc>
+                <a:extLst>
+                  <a:ext uri="{0D108BD9-81ED-4DB2-BD59-A6C34878D82A}">
+                    <a16:rowId xmlns:a16="http://schemas.microsoft.com/office/drawing/2014/main" val="10005"/>
+                  </a:ext>
+                </a:extLst>
               </a:tr>
               <a:tr h="370840">
                 <a:tc>
@@ -5773,6 +6389,11 @@
                     </a:solidFill>
                   </a:tcPr>
                 </a:tc>
+                <a:extLst>
+                  <a:ext uri="{0D108BD9-81ED-4DB2-BD59-A6C34878D82A}">
+                    <a16:rowId xmlns:a16="http://schemas.microsoft.com/office/drawing/2014/main" val="10006"/>
+                  </a:ext>
+                </a:extLst>
               </a:tr>
               <a:tr h="370840">
                 <a:tc>
@@ -5859,6 +6480,11 @@
                     </a:solidFill>
                   </a:tcPr>
                 </a:tc>
+                <a:extLst>
+                  <a:ext uri="{0D108BD9-81ED-4DB2-BD59-A6C34878D82A}">
+                    <a16:rowId xmlns:a16="http://schemas.microsoft.com/office/drawing/2014/main" val="10007"/>
+                  </a:ext>
+                </a:extLst>
               </a:tr>
             </a:tbl>
           </a:graphicData>
@@ -6063,7 +6689,13 @@
                 <a:tableStyleId>{5940675A-B579-460E-94D1-54222C63F5DA}</a:tableStyleId>
               </a:tblPr>
               <a:tblGrid>
-                <a:gridCol w="7556500"/>
+                <a:gridCol w="7556500">
+                  <a:extLst>
+                    <a:ext uri="{9D8B030D-6E8A-4147-A177-3AD203B41FA5}">
+                      <a16:colId xmlns:a16="http://schemas.microsoft.com/office/drawing/2014/main" val="20000"/>
+                    </a:ext>
+                  </a:extLst>
+                </a:gridCol>
               </a:tblGrid>
               <a:tr h="342902">
                 <a:tc>
@@ -6088,6 +6720,11 @@
                   </a:txBody>
                   <a:tcPr/>
                 </a:tc>
+                <a:extLst>
+                  <a:ext uri="{0D108BD9-81ED-4DB2-BD59-A6C34878D82A}">
+                    <a16:rowId xmlns:a16="http://schemas.microsoft.com/office/drawing/2014/main" val="10000"/>
+                  </a:ext>
+                </a:extLst>
               </a:tr>
               <a:tr h="2290108">
                 <a:tc>
@@ -6128,6 +6765,11 @@
                   </a:txBody>
                   <a:tcPr/>
                 </a:tc>
+                <a:extLst>
+                  <a:ext uri="{0D108BD9-81ED-4DB2-BD59-A6C34878D82A}">
+                    <a16:rowId xmlns:a16="http://schemas.microsoft.com/office/drawing/2014/main" val="10001"/>
+                  </a:ext>
+                </a:extLst>
               </a:tr>
               <a:tr h="2290108">
                 <a:tc>
@@ -6168,6 +6810,11 @@
                   </a:txBody>
                   <a:tcPr/>
                 </a:tc>
+                <a:extLst>
+                  <a:ext uri="{0D108BD9-81ED-4DB2-BD59-A6C34878D82A}">
+                    <a16:rowId xmlns:a16="http://schemas.microsoft.com/office/drawing/2014/main" val="10002"/>
+                  </a:ext>
+                </a:extLst>
               </a:tr>
             </a:tbl>
           </a:graphicData>
@@ -6247,7 +6894,13 @@
                 <a:tableStyleId>{5940675A-B579-460E-94D1-54222C63F5DA}</a:tableStyleId>
               </a:tblPr>
               <a:tblGrid>
-                <a:gridCol w="7556500"/>
+                <a:gridCol w="7556500">
+                  <a:extLst>
+                    <a:ext uri="{9D8B030D-6E8A-4147-A177-3AD203B41FA5}">
+                      <a16:colId xmlns:a16="http://schemas.microsoft.com/office/drawing/2014/main" val="20000"/>
+                    </a:ext>
+                  </a:extLst>
+                </a:gridCol>
               </a:tblGrid>
               <a:tr h="342902">
                 <a:tc>
@@ -6272,6 +6925,11 @@
                   </a:txBody>
                   <a:tcPr/>
                 </a:tc>
+                <a:extLst>
+                  <a:ext uri="{0D108BD9-81ED-4DB2-BD59-A6C34878D82A}">
+                    <a16:rowId xmlns:a16="http://schemas.microsoft.com/office/drawing/2014/main" val="10000"/>
+                  </a:ext>
+                </a:extLst>
               </a:tr>
               <a:tr h="2290108">
                 <a:tc>
@@ -6413,6 +7071,11 @@
                   </a:txBody>
                   <a:tcPr/>
                 </a:tc>
+                <a:extLst>
+                  <a:ext uri="{0D108BD9-81ED-4DB2-BD59-A6C34878D82A}">
+                    <a16:rowId xmlns:a16="http://schemas.microsoft.com/office/drawing/2014/main" val="10001"/>
+                  </a:ext>
+                </a:extLst>
               </a:tr>
               <a:tr h="2290108">
                 <a:tc>
@@ -6482,6 +7145,11 @@
                   </a:txBody>
                   <a:tcPr/>
                 </a:tc>
+                <a:extLst>
+                  <a:ext uri="{0D108BD9-81ED-4DB2-BD59-A6C34878D82A}">
+                    <a16:rowId xmlns:a16="http://schemas.microsoft.com/office/drawing/2014/main" val="10002"/>
+                  </a:ext>
+                </a:extLst>
               </a:tr>
             </a:tbl>
           </a:graphicData>
@@ -6561,7 +7229,13 @@
                 <a:tableStyleId>{5940675A-B579-460E-94D1-54222C63F5DA}</a:tableStyleId>
               </a:tblPr>
               <a:tblGrid>
-                <a:gridCol w="7556500"/>
+                <a:gridCol w="7556500">
+                  <a:extLst>
+                    <a:ext uri="{9D8B030D-6E8A-4147-A177-3AD203B41FA5}">
+                      <a16:colId xmlns:a16="http://schemas.microsoft.com/office/drawing/2014/main" val="20000"/>
+                    </a:ext>
+                  </a:extLst>
+                </a:gridCol>
               </a:tblGrid>
               <a:tr h="342902">
                 <a:tc>
@@ -6594,6 +7268,11 @@
                   </a:txBody>
                   <a:tcPr/>
                 </a:tc>
+                <a:extLst>
+                  <a:ext uri="{0D108BD9-81ED-4DB2-BD59-A6C34878D82A}">
+                    <a16:rowId xmlns:a16="http://schemas.microsoft.com/office/drawing/2014/main" val="10000"/>
+                  </a:ext>
+                </a:extLst>
               </a:tr>
               <a:tr h="2290108">
                 <a:tc>
@@ -6934,6 +7613,11 @@
                   </a:txBody>
                   <a:tcPr/>
                 </a:tc>
+                <a:extLst>
+                  <a:ext uri="{0D108BD9-81ED-4DB2-BD59-A6C34878D82A}">
+                    <a16:rowId xmlns:a16="http://schemas.microsoft.com/office/drawing/2014/main" val="10001"/>
+                  </a:ext>
+                </a:extLst>
               </a:tr>
               <a:tr h="2290108">
                 <a:tc>
@@ -7027,6 +7711,11 @@
                   </a:txBody>
                   <a:tcPr/>
                 </a:tc>
+                <a:extLst>
+                  <a:ext uri="{0D108BD9-81ED-4DB2-BD59-A6C34878D82A}">
+                    <a16:rowId xmlns:a16="http://schemas.microsoft.com/office/drawing/2014/main" val="10002"/>
+                  </a:ext>
+                </a:extLst>
               </a:tr>
             </a:tbl>
           </a:graphicData>
@@ -7106,8 +7795,20 @@
                 <a:tableStyleId>{5940675A-B579-460E-94D1-54222C63F5DA}</a:tableStyleId>
               </a:tblPr>
               <a:tblGrid>
-                <a:gridCol w="3778250"/>
-                <a:gridCol w="3778250"/>
+                <a:gridCol w="3778250">
+                  <a:extLst>
+                    <a:ext uri="{9D8B030D-6E8A-4147-A177-3AD203B41FA5}">
+                      <a16:colId xmlns:a16="http://schemas.microsoft.com/office/drawing/2014/main" val="20000"/>
+                    </a:ext>
+                  </a:extLst>
+                </a:gridCol>
+                <a:gridCol w="3778250">
+                  <a:extLst>
+                    <a:ext uri="{9D8B030D-6E8A-4147-A177-3AD203B41FA5}">
+                      <a16:colId xmlns:a16="http://schemas.microsoft.com/office/drawing/2014/main" val="20001"/>
+                    </a:ext>
+                  </a:extLst>
+                </a:gridCol>
               </a:tblGrid>
               <a:tr h="268531">
                 <a:tc gridSpan="2">
@@ -7150,6 +7851,11 @@
                   </a:txBody>
                   <a:tcPr/>
                 </a:tc>
+                <a:extLst>
+                  <a:ext uri="{0D108BD9-81ED-4DB2-BD59-A6C34878D82A}">
+                    <a16:rowId xmlns:a16="http://schemas.microsoft.com/office/drawing/2014/main" val="10000"/>
+                  </a:ext>
+                </a:extLst>
               </a:tr>
               <a:tr h="2916457">
                 <a:tc>
@@ -8585,6 +9291,11 @@
                     </a:lnL>
                   </a:tcPr>
                 </a:tc>
+                <a:extLst>
+                  <a:ext uri="{0D108BD9-81ED-4DB2-BD59-A6C34878D82A}">
+                    <a16:rowId xmlns:a16="http://schemas.microsoft.com/office/drawing/2014/main" val="10001"/>
+                  </a:ext>
+                </a:extLst>
               </a:tr>
               <a:tr h="1793413">
                 <a:tc gridSpan="2">
@@ -8753,6 +9464,11 @@
                   </a:txBody>
                   <a:tcPr/>
                 </a:tc>
+                <a:extLst>
+                  <a:ext uri="{0D108BD9-81ED-4DB2-BD59-A6C34878D82A}">
+                    <a16:rowId xmlns:a16="http://schemas.microsoft.com/office/drawing/2014/main" val="10002"/>
+                  </a:ext>
+                </a:extLst>
               </a:tr>
             </a:tbl>
           </a:graphicData>
@@ -8832,8 +9548,20 @@
                 <a:tableStyleId>{5940675A-B579-460E-94D1-54222C63F5DA}</a:tableStyleId>
               </a:tblPr>
               <a:tblGrid>
-                <a:gridCol w="3778250"/>
-                <a:gridCol w="3778250"/>
+                <a:gridCol w="3778250">
+                  <a:extLst>
+                    <a:ext uri="{9D8B030D-6E8A-4147-A177-3AD203B41FA5}">
+                      <a16:colId xmlns:a16="http://schemas.microsoft.com/office/drawing/2014/main" val="20000"/>
+                    </a:ext>
+                  </a:extLst>
+                </a:gridCol>
+                <a:gridCol w="3778250">
+                  <a:extLst>
+                    <a:ext uri="{9D8B030D-6E8A-4147-A177-3AD203B41FA5}">
+                      <a16:colId xmlns:a16="http://schemas.microsoft.com/office/drawing/2014/main" val="20001"/>
+                    </a:ext>
+                  </a:extLst>
+                </a:gridCol>
               </a:tblGrid>
               <a:tr h="261903">
                 <a:tc gridSpan="2">
@@ -8873,6 +9601,11 @@
                   </a:txBody>
                   <a:tcPr/>
                 </a:tc>
+                <a:extLst>
+                  <a:ext uri="{0D108BD9-81ED-4DB2-BD59-A6C34878D82A}">
+                    <a16:rowId xmlns:a16="http://schemas.microsoft.com/office/drawing/2014/main" val="10000"/>
+                  </a:ext>
+                </a:extLst>
               </a:tr>
               <a:tr h="3055536">
                 <a:tc>
@@ -10029,6 +10762,11 @@
                     </a:lnL>
                   </a:tcPr>
                 </a:tc>
+                <a:extLst>
+                  <a:ext uri="{0D108BD9-81ED-4DB2-BD59-A6C34878D82A}">
+                    <a16:rowId xmlns:a16="http://schemas.microsoft.com/office/drawing/2014/main" val="10001"/>
+                  </a:ext>
+                </a:extLst>
               </a:tr>
               <a:tr h="1559361">
                 <a:tc gridSpan="2">
@@ -10180,6 +10918,11 @@
                   </a:txBody>
                   <a:tcPr/>
                 </a:tc>
+                <a:extLst>
+                  <a:ext uri="{0D108BD9-81ED-4DB2-BD59-A6C34878D82A}">
+                    <a16:rowId xmlns:a16="http://schemas.microsoft.com/office/drawing/2014/main" val="10002"/>
+                  </a:ext>
+                </a:extLst>
               </a:tr>
             </a:tbl>
           </a:graphicData>
@@ -10259,7 +11002,13 @@
                 <a:tableStyleId>{5940675A-B579-460E-94D1-54222C63F5DA}</a:tableStyleId>
               </a:tblPr>
               <a:tblGrid>
-                <a:gridCol w="7556500"/>
+                <a:gridCol w="7556500">
+                  <a:extLst>
+                    <a:ext uri="{9D8B030D-6E8A-4147-A177-3AD203B41FA5}">
+                      <a16:colId xmlns:a16="http://schemas.microsoft.com/office/drawing/2014/main" val="20000"/>
+                    </a:ext>
+                  </a:extLst>
+                </a:gridCol>
               </a:tblGrid>
               <a:tr h="342902">
                 <a:tc>
@@ -10292,6 +11041,11 @@
                   </a:txBody>
                   <a:tcPr/>
                 </a:tc>
+                <a:extLst>
+                  <a:ext uri="{0D108BD9-81ED-4DB2-BD59-A6C34878D82A}">
+                    <a16:rowId xmlns:a16="http://schemas.microsoft.com/office/drawing/2014/main" val="10000"/>
+                  </a:ext>
+                </a:extLst>
               </a:tr>
               <a:tr h="2290108">
                 <a:tc>
@@ -10659,6 +11413,11 @@
                   </a:txBody>
                   <a:tcPr/>
                 </a:tc>
+                <a:extLst>
+                  <a:ext uri="{0D108BD9-81ED-4DB2-BD59-A6C34878D82A}">
+                    <a16:rowId xmlns:a16="http://schemas.microsoft.com/office/drawing/2014/main" val="10001"/>
+                  </a:ext>
+                </a:extLst>
               </a:tr>
               <a:tr h="2290108">
                 <a:tc>
@@ -10810,6 +11569,11 @@
                   </a:txBody>
                   <a:tcPr/>
                 </a:tc>
+                <a:extLst>
+                  <a:ext uri="{0D108BD9-81ED-4DB2-BD59-A6C34878D82A}">
+                    <a16:rowId xmlns:a16="http://schemas.microsoft.com/office/drawing/2014/main" val="10002"/>
+                  </a:ext>
+                </a:extLst>
               </a:tr>
             </a:tbl>
           </a:graphicData>

</xml_diff>

<commit_message>
#890 | Class Design | doc | 완료된 To do 항목 보이기/숨기기 기능 설계
</commit_message>
<xml_diff>
--- a/doc/3_ 설계서/Class Design.pptx
+++ b/doc/3_ 설계서/Class Design.pptx
@@ -870,6 +870,91 @@
 </p:notesMaster>
 </file>
 
+<file path=ppt/notesSlides/notesSlide1.xml><?xml version="1.0" encoding="utf-8"?>
+<p:notes xmlns:a="http://schemas.openxmlformats.org/drawingml/2006/main" xmlns:r="http://schemas.openxmlformats.org/officeDocument/2006/relationships" xmlns:p="http://schemas.openxmlformats.org/presentationml/2006/main">
+  <p:cSld>
+    <p:spTree>
+      <p:nvGrpSpPr>
+        <p:cNvPr id="1" name=""/>
+        <p:cNvGrpSpPr/>
+        <p:nvPr/>
+      </p:nvGrpSpPr>
+      <p:grpSpPr>
+        <a:xfrm>
+          <a:off x="0" y="0"/>
+          <a:ext cx="0" cy="0"/>
+          <a:chOff x="0" y="0"/>
+          <a:chExt cx="0" cy="0"/>
+        </a:xfrm>
+      </p:grpSpPr>
+      <p:sp>
+        <p:nvSpPr>
+          <p:cNvPr id="2" name="Slide Image Placeholder 1"/>
+          <p:cNvSpPr>
+            <a:spLocks noGrp="1" noRot="1" noChangeAspect="1"/>
+          </p:cNvSpPr>
+          <p:nvPr>
+            <p:ph type="sldImg"/>
+          </p:nvPr>
+        </p:nvSpPr>
+        <p:spPr/>
+      </p:sp>
+      <p:sp>
+        <p:nvSpPr>
+          <p:cNvPr id="3" name="Notes Placeholder 2"/>
+          <p:cNvSpPr>
+            <a:spLocks noGrp="1"/>
+          </p:cNvSpPr>
+          <p:nvPr>
+            <p:ph type="body" idx="1"/>
+          </p:nvPr>
+        </p:nvSpPr>
+        <p:spPr/>
+        <p:txBody>
+          <a:bodyPr/>
+          <a:lstStyle/>
+          <a:p>
+            <a:endParaRPr lang="en-US"/>
+          </a:p>
+        </p:txBody>
+      </p:sp>
+      <p:sp>
+        <p:nvSpPr>
+          <p:cNvPr id="4" name="Slide Number Placeholder 3"/>
+          <p:cNvSpPr>
+            <a:spLocks noGrp="1"/>
+          </p:cNvSpPr>
+          <p:nvPr>
+            <p:ph type="sldNum" sz="quarter" idx="10"/>
+          </p:nvPr>
+        </p:nvSpPr>
+        <p:spPr/>
+        <p:txBody>
+          <a:bodyPr/>
+          <a:lstStyle/>
+          <a:p>
+            <a:fld id="{379E618C-E705-4CD1-A19E-88052652622A}" type="slidenum">
+              <a:rPr lang="en-US" smtClean="0"/>
+              <a:pPr/>
+              <a:t>3</a:t>
+            </a:fld>
+            <a:endParaRPr lang="en-US"/>
+          </a:p>
+        </p:txBody>
+      </p:sp>
+    </p:spTree>
+    <p:extLst>
+      <p:ext uri="{BB962C8B-B14F-4D97-AF65-F5344CB8AC3E}">
+        <p14:creationId xmlns:p14="http://schemas.microsoft.com/office/powerpoint/2010/main" val="2043623095"/>
+      </p:ext>
+    </p:extLst>
+  </p:cSld>
+  <p:clrMapOvr>
+    <a:masterClrMapping/>
+  </p:clrMapOvr>
+</p:notes>
+</file>
+
 <file path=ppt/slideLayouts/slideLayout1.xml><?xml version="1.0" encoding="utf-8"?>
 <p:sldLayout xmlns:a="http://schemas.openxmlformats.org/drawingml/2006/main" xmlns:r="http://schemas.openxmlformats.org/officeDocument/2006/relationships" xmlns:p="http://schemas.openxmlformats.org/presentationml/2006/main" showMasterSp="0" preserve="1" userDrawn="1">
   <p:cSld name="제목 슬라이드">
@@ -1079,6 +1164,10 @@
             </a:lvl1pPr>
           </a:lstStyle>
           <a:p>
+            <a:r>
+              <a:rPr lang="en-US" altLang="ko-KR" dirty="0"/>
+              <a:t/>
+            </a:r>
             <a:br>
               <a:rPr lang="en-US" altLang="ko-KR" dirty="0"/>
             </a:br>
@@ -1123,7 +1212,7 @@
           <p:nvPr userDrawn="1">
             <p:extLst>
               <p:ext uri="{D42A27DB-BD31-4B8C-83A1-F6EECF244321}">
-                <p14:modId xmlns:p14="http://schemas.microsoft.com/office/powerpoint/2010/main" val="4220479093"/>
+                <p14:modId xmlns:p14="http://schemas.microsoft.com/office/powerpoint/2010/main" val="575147405"/>
               </p:ext>
             </p:extLst>
           </p:nvPr>
@@ -1140,28 +1229,28 @@
                 <a:gridCol w="1022523">
                   <a:extLst>
                     <a:ext uri="{9D8B030D-6E8A-4147-A177-3AD203B41FA5}">
-                      <a16:colId xmlns:a16="http://schemas.microsoft.com/office/drawing/2014/main" val="20000"/>
+                      <a16:colId xmlns="" xmlns:a16="http://schemas.microsoft.com/office/drawing/2014/main" val="20000"/>
                     </a:ext>
                   </a:extLst>
                 </a:gridCol>
                 <a:gridCol w="3439486">
                   <a:extLst>
                     <a:ext uri="{9D8B030D-6E8A-4147-A177-3AD203B41FA5}">
-                      <a16:colId xmlns:a16="http://schemas.microsoft.com/office/drawing/2014/main" val="20001"/>
+                      <a16:colId xmlns="" xmlns:a16="http://schemas.microsoft.com/office/drawing/2014/main" val="20001"/>
                     </a:ext>
                   </a:extLst>
                 </a:gridCol>
                 <a:gridCol w="947956">
                   <a:extLst>
                     <a:ext uri="{9D8B030D-6E8A-4147-A177-3AD203B41FA5}">
-                      <a16:colId xmlns:a16="http://schemas.microsoft.com/office/drawing/2014/main" val="20002"/>
+                      <a16:colId xmlns="" xmlns:a16="http://schemas.microsoft.com/office/drawing/2014/main" val="20002"/>
                     </a:ext>
                   </a:extLst>
                 </a:gridCol>
                 <a:gridCol w="3523377">
                   <a:extLst>
                     <a:ext uri="{9D8B030D-6E8A-4147-A177-3AD203B41FA5}">
-                      <a16:colId xmlns:a16="http://schemas.microsoft.com/office/drawing/2014/main" val="20003"/>
+                      <a16:colId xmlns="" xmlns:a16="http://schemas.microsoft.com/office/drawing/2014/main" val="20003"/>
                     </a:ext>
                   </a:extLst>
                 </a:gridCol>
@@ -1577,7 +1666,7 @@
                 </a:tc>
                 <a:extLst>
                   <a:ext uri="{0D108BD9-81ED-4DB2-BD59-A6C34878D82A}">
-                    <a16:rowId xmlns:a16="http://schemas.microsoft.com/office/drawing/2014/main" val="10000"/>
+                    <a16:rowId xmlns="" xmlns:a16="http://schemas.microsoft.com/office/drawing/2014/main" val="10000"/>
                   </a:ext>
                 </a:extLst>
               </a:tr>
@@ -1862,7 +1951,7 @@
                         <a:tabLst/>
                       </a:pPr>
                       <a:r>
-                        <a:rPr kumimoji="1" lang="en-US" altLang="ko-KR" sz="1050" b="0" i="0" u="none" strike="noStrike" cap="none" normalizeH="0" baseline="0" dirty="0">
+                        <a:rPr kumimoji="1" lang="en-US" altLang="ko-KR" sz="1050" b="0" i="0" u="none" strike="noStrike" cap="none" normalizeH="0" baseline="0" dirty="0" smtClean="0">
                           <a:ln>
                             <a:noFill/>
                           </a:ln>
@@ -1873,7 +1962,7 @@
                           <a:latin typeface="맑은 고딕" pitchFamily="50" charset="-127"/>
                           <a:ea typeface="맑은 고딕" pitchFamily="50" charset="-127"/>
                         </a:rPr>
-                        <a:t>V1.0.1</a:t>
+                        <a:t>V2.0.0</a:t>
                       </a:r>
                       <a:endParaRPr kumimoji="1" lang="ko-KR" altLang="ko-KR" sz="1050" b="0" i="0" u="none" strike="noStrike" cap="none" normalizeH="0" baseline="0" dirty="0">
                         <a:ln>
@@ -1936,7 +2025,7 @@
                 </a:tc>
                 <a:extLst>
                   <a:ext uri="{0D108BD9-81ED-4DB2-BD59-A6C34878D82A}">
-                    <a16:rowId xmlns:a16="http://schemas.microsoft.com/office/drawing/2014/main" val="10001"/>
+                    <a16:rowId xmlns="" xmlns:a16="http://schemas.microsoft.com/office/drawing/2014/main" val="10001"/>
                   </a:ext>
                 </a:extLst>
               </a:tr>
@@ -2378,7 +2467,7 @@
           <p:nvPr userDrawn="1">
             <p:extLst>
               <p:ext uri="{D42A27DB-BD31-4B8C-83A1-F6EECF244321}">
-                <p14:modId xmlns:p14="http://schemas.microsoft.com/office/powerpoint/2010/main" val="492983033"/>
+                <p14:modId xmlns:p14="http://schemas.microsoft.com/office/powerpoint/2010/main" val="1315062639"/>
               </p:ext>
             </p:extLst>
           </p:nvPr>
@@ -2395,28 +2484,28 @@
                 <a:gridCol w="1022523">
                   <a:extLst>
                     <a:ext uri="{9D8B030D-6E8A-4147-A177-3AD203B41FA5}">
-                      <a16:colId xmlns:a16="http://schemas.microsoft.com/office/drawing/2014/main" val="20000"/>
+                      <a16:colId xmlns="" xmlns:a16="http://schemas.microsoft.com/office/drawing/2014/main" val="20000"/>
                     </a:ext>
                   </a:extLst>
                 </a:gridCol>
                 <a:gridCol w="3439486">
                   <a:extLst>
                     <a:ext uri="{9D8B030D-6E8A-4147-A177-3AD203B41FA5}">
-                      <a16:colId xmlns:a16="http://schemas.microsoft.com/office/drawing/2014/main" val="20001"/>
+                      <a16:colId xmlns="" xmlns:a16="http://schemas.microsoft.com/office/drawing/2014/main" val="20001"/>
                     </a:ext>
                   </a:extLst>
                 </a:gridCol>
                 <a:gridCol w="947956">
                   <a:extLst>
                     <a:ext uri="{9D8B030D-6E8A-4147-A177-3AD203B41FA5}">
-                      <a16:colId xmlns:a16="http://schemas.microsoft.com/office/drawing/2014/main" val="20002"/>
+                      <a16:colId xmlns="" xmlns:a16="http://schemas.microsoft.com/office/drawing/2014/main" val="20002"/>
                     </a:ext>
                   </a:extLst>
                 </a:gridCol>
                 <a:gridCol w="3523377">
                   <a:extLst>
                     <a:ext uri="{9D8B030D-6E8A-4147-A177-3AD203B41FA5}">
-                      <a16:colId xmlns:a16="http://schemas.microsoft.com/office/drawing/2014/main" val="20003"/>
+                      <a16:colId xmlns="" xmlns:a16="http://schemas.microsoft.com/office/drawing/2014/main" val="20003"/>
                     </a:ext>
                   </a:extLst>
                 </a:gridCol>
@@ -2836,7 +2925,7 @@
                 </a:tc>
                 <a:extLst>
                   <a:ext uri="{0D108BD9-81ED-4DB2-BD59-A6C34878D82A}">
-                    <a16:rowId xmlns:a16="http://schemas.microsoft.com/office/drawing/2014/main" val="10000"/>
+                    <a16:rowId xmlns="" xmlns:a16="http://schemas.microsoft.com/office/drawing/2014/main" val="10000"/>
                   </a:ext>
                 </a:extLst>
               </a:tr>
@@ -3121,7 +3210,7 @@
                         <a:tabLst/>
                       </a:pPr>
                       <a:r>
-                        <a:rPr lang="en-US" sz="1050" kern="1200" dirty="0">
+                        <a:rPr lang="en-US" sz="1050" kern="1200" dirty="0" smtClean="0">
                           <a:solidFill>
                             <a:schemeClr val="tx1"/>
                           </a:solidFill>
@@ -3130,8 +3219,17 @@
                           <a:ea typeface="맑은 고딕" panose="020B0503020000020004" pitchFamily="50" charset="-127"/>
                           <a:cs typeface="Malgun Gothic" charset="-127"/>
                         </a:rPr>
-                        <a:t>V1.0.1</a:t>
-                      </a:r>
+                        <a:t>V2.0.0</a:t>
+                      </a:r>
+                      <a:endParaRPr lang="en-US" sz="1050" kern="1200" dirty="0">
+                        <a:solidFill>
+                          <a:schemeClr val="tx1"/>
+                        </a:solidFill>
+                        <a:effectLst/>
+                        <a:latin typeface="맑은 고딕" panose="020B0503020000020004" pitchFamily="50" charset="-127"/>
+                        <a:ea typeface="맑은 고딕" panose="020B0503020000020004" pitchFamily="50" charset="-127"/>
+                        <a:cs typeface="Malgun Gothic" charset="-127"/>
+                      </a:endParaRPr>
                     </a:p>
                   </a:txBody>
                   <a:tcPr marL="36000" marR="36000" marT="18000" marB="18000" anchor="ctr" horzOverflow="overflow">
@@ -3182,7 +3280,7 @@
                 </a:tc>
                 <a:extLst>
                   <a:ext uri="{0D108BD9-81ED-4DB2-BD59-A6C34878D82A}">
-                    <a16:rowId xmlns:a16="http://schemas.microsoft.com/office/drawing/2014/main" val="10001"/>
+                    <a16:rowId xmlns="" xmlns:a16="http://schemas.microsoft.com/office/drawing/2014/main" val="10001"/>
                   </a:ext>
                 </a:extLst>
               </a:tr>
@@ -4073,6 +4171,10 @@
           <a:bodyPr/>
           <a:lstStyle/>
           <a:p>
+            <a:r>
+              <a:rPr lang="en-US" altLang="ko-KR" dirty="0"/>
+              <a:t/>
+            </a:r>
             <a:br>
               <a:rPr lang="en-US" altLang="ko-KR" dirty="0"/>
             </a:br>
@@ -4227,14 +4329,14 @@
                 <a:gridCol w="3778250">
                   <a:extLst>
                     <a:ext uri="{9D8B030D-6E8A-4147-A177-3AD203B41FA5}">
-                      <a16:colId xmlns:a16="http://schemas.microsoft.com/office/drawing/2014/main" val="20000"/>
+                      <a16:colId xmlns="" xmlns:a16="http://schemas.microsoft.com/office/drawing/2014/main" val="20000"/>
                     </a:ext>
                   </a:extLst>
                 </a:gridCol>
                 <a:gridCol w="3778250">
                   <a:extLst>
                     <a:ext uri="{9D8B030D-6E8A-4147-A177-3AD203B41FA5}">
-                      <a16:colId xmlns:a16="http://schemas.microsoft.com/office/drawing/2014/main" val="704386244"/>
+                      <a16:colId xmlns="" xmlns:a16="http://schemas.microsoft.com/office/drawing/2014/main" val="704386244"/>
                     </a:ext>
                   </a:extLst>
                 </a:gridCol>
@@ -4281,7 +4383,7 @@
                 </a:tc>
                 <a:extLst>
                   <a:ext uri="{0D108BD9-81ED-4DB2-BD59-A6C34878D82A}">
-                    <a16:rowId xmlns:a16="http://schemas.microsoft.com/office/drawing/2014/main" val="10000"/>
+                    <a16:rowId xmlns="" xmlns:a16="http://schemas.microsoft.com/office/drawing/2014/main" val="10000"/>
                   </a:ext>
                 </a:extLst>
               </a:tr>
@@ -5417,7 +5519,7 @@
                 </a:tc>
                 <a:extLst>
                   <a:ext uri="{0D108BD9-81ED-4DB2-BD59-A6C34878D82A}">
-                    <a16:rowId xmlns:a16="http://schemas.microsoft.com/office/drawing/2014/main" val="10001"/>
+                    <a16:rowId xmlns="" xmlns:a16="http://schemas.microsoft.com/office/drawing/2014/main" val="10001"/>
                   </a:ext>
                 </a:extLst>
               </a:tr>
@@ -5639,7 +5741,7 @@
                 </a:tc>
                 <a:extLst>
                   <a:ext uri="{0D108BD9-81ED-4DB2-BD59-A6C34878D82A}">
-                    <a16:rowId xmlns:a16="http://schemas.microsoft.com/office/drawing/2014/main" val="10002"/>
+                    <a16:rowId xmlns="" xmlns:a16="http://schemas.microsoft.com/office/drawing/2014/main" val="10002"/>
                   </a:ext>
                 </a:extLst>
               </a:tr>
@@ -5737,7 +5839,7 @@
                 <a:gridCol w="7556500">
                   <a:extLst>
                     <a:ext uri="{9D8B030D-6E8A-4147-A177-3AD203B41FA5}">
-                      <a16:colId xmlns:a16="http://schemas.microsoft.com/office/drawing/2014/main" val="20000"/>
+                      <a16:colId xmlns="" xmlns:a16="http://schemas.microsoft.com/office/drawing/2014/main" val="20000"/>
                     </a:ext>
                   </a:extLst>
                 </a:gridCol>
@@ -5770,7 +5872,7 @@
                 </a:tc>
                 <a:extLst>
                   <a:ext uri="{0D108BD9-81ED-4DB2-BD59-A6C34878D82A}">
-                    <a16:rowId xmlns:a16="http://schemas.microsoft.com/office/drawing/2014/main" val="10000"/>
+                    <a16:rowId xmlns="" xmlns:a16="http://schemas.microsoft.com/office/drawing/2014/main" val="10000"/>
                   </a:ext>
                 </a:extLst>
               </a:tr>
@@ -5987,7 +6089,7 @@
                 </a:tc>
                 <a:extLst>
                   <a:ext uri="{0D108BD9-81ED-4DB2-BD59-A6C34878D82A}">
-                    <a16:rowId xmlns:a16="http://schemas.microsoft.com/office/drawing/2014/main" val="10001"/>
+                    <a16:rowId xmlns="" xmlns:a16="http://schemas.microsoft.com/office/drawing/2014/main" val="10001"/>
                   </a:ext>
                 </a:extLst>
               </a:tr>
@@ -6199,7 +6301,7 @@
                 </a:tc>
                 <a:extLst>
                   <a:ext uri="{0D108BD9-81ED-4DB2-BD59-A6C34878D82A}">
-                    <a16:rowId xmlns:a16="http://schemas.microsoft.com/office/drawing/2014/main" val="10002"/>
+                    <a16:rowId xmlns="" xmlns:a16="http://schemas.microsoft.com/office/drawing/2014/main" val="10002"/>
                   </a:ext>
                 </a:extLst>
               </a:tr>
@@ -6297,7 +6399,7 @@
                 <a:gridCol w="7556500">
                   <a:extLst>
                     <a:ext uri="{9D8B030D-6E8A-4147-A177-3AD203B41FA5}">
-                      <a16:colId xmlns:a16="http://schemas.microsoft.com/office/drawing/2014/main" val="20000"/>
+                      <a16:colId xmlns="" xmlns:a16="http://schemas.microsoft.com/office/drawing/2014/main" val="20000"/>
                     </a:ext>
                   </a:extLst>
                 </a:gridCol>
@@ -6330,7 +6432,7 @@
                 </a:tc>
                 <a:extLst>
                   <a:ext uri="{0D108BD9-81ED-4DB2-BD59-A6C34878D82A}">
-                    <a16:rowId xmlns:a16="http://schemas.microsoft.com/office/drawing/2014/main" val="10000"/>
+                    <a16:rowId xmlns="" xmlns:a16="http://schemas.microsoft.com/office/drawing/2014/main" val="10000"/>
                   </a:ext>
                 </a:extLst>
               </a:tr>
@@ -6509,7 +6611,7 @@
                 </a:tc>
                 <a:extLst>
                   <a:ext uri="{0D108BD9-81ED-4DB2-BD59-A6C34878D82A}">
-                    <a16:rowId xmlns:a16="http://schemas.microsoft.com/office/drawing/2014/main" val="10001"/>
+                    <a16:rowId xmlns="" xmlns:a16="http://schemas.microsoft.com/office/drawing/2014/main" val="10001"/>
                   </a:ext>
                 </a:extLst>
               </a:tr>
@@ -6671,7 +6773,7 @@
                 </a:tc>
                 <a:extLst>
                   <a:ext uri="{0D108BD9-81ED-4DB2-BD59-A6C34878D82A}">
-                    <a16:rowId xmlns:a16="http://schemas.microsoft.com/office/drawing/2014/main" val="10002"/>
+                    <a16:rowId xmlns="" xmlns:a16="http://schemas.microsoft.com/office/drawing/2014/main" val="10002"/>
                   </a:ext>
                 </a:extLst>
               </a:tr>
@@ -6750,14 +6852,14 @@
           <p:nvPr>
             <p:extLst>
               <p:ext uri="{D42A27DB-BD31-4B8C-83A1-F6EECF244321}">
-                <p14:modId xmlns:p14="http://schemas.microsoft.com/office/powerpoint/2010/main" val="2580429335"/>
+                <p14:modId xmlns:p14="http://schemas.microsoft.com/office/powerpoint/2010/main" val="368754051"/>
               </p:ext>
             </p:extLst>
           </p:nvPr>
         </p:nvGraphicFramePr>
         <p:xfrm>
-          <a:off x="838200" y="1066798"/>
-          <a:ext cx="7556500" cy="5284770"/>
+          <a:off x="838200" y="940777"/>
+          <a:ext cx="7556500" cy="5305654"/>
         </p:xfrm>
         <a:graphic>
           <a:graphicData uri="http://schemas.openxmlformats.org/drawingml/2006/table">
@@ -6766,16 +6868,17 @@
                 <a:tableStyleId>{5940675A-B579-460E-94D1-54222C63F5DA}</a:tableStyleId>
               </a:tblPr>
               <a:tblGrid>
-                <a:gridCol w="7556500">
+                <a:gridCol w="3778250">
                   <a:extLst>
                     <a:ext uri="{9D8B030D-6E8A-4147-A177-3AD203B41FA5}">
-                      <a16:colId xmlns:a16="http://schemas.microsoft.com/office/drawing/2014/main" val="20000"/>
+                      <a16:colId xmlns="" xmlns:a16="http://schemas.microsoft.com/office/drawing/2014/main" val="20000"/>
                     </a:ext>
                   </a:extLst>
                 </a:gridCol>
+                <a:gridCol w="3778250"/>
               </a:tblGrid>
-              <a:tr h="342902">
-                <a:tc>
+              <a:tr h="281376">
+                <a:tc gridSpan="2">
                   <a:txBody>
                     <a:bodyPr/>
                     <a:lstStyle/>
@@ -6788,17 +6891,27 @@
                         </a:rPr>
                         <a:t>Database()</a:t>
                       </a:r>
+                    </a:p>
+                  </a:txBody>
+                  <a:tcPr/>
+                </a:tc>
+                <a:tc hMerge="1">
+                  <a:txBody>
+                    <a:bodyPr/>
+                    <a:lstStyle/>
+                    <a:p>
+                      <a:endParaRPr lang="en-US"/>
                     </a:p>
                   </a:txBody>
                   <a:tcPr/>
                 </a:tc>
                 <a:extLst>
                   <a:ext uri="{0D108BD9-81ED-4DB2-BD59-A6C34878D82A}">
-                    <a16:rowId xmlns:a16="http://schemas.microsoft.com/office/drawing/2014/main" val="10000"/>
+                    <a16:rowId xmlns="" xmlns:a16="http://schemas.microsoft.com/office/drawing/2014/main" val="10000"/>
                   </a:ext>
                 </a:extLst>
               </a:tr>
-              <a:tr h="2290108">
+              <a:tr h="2189638">
                 <a:tc>
                   <a:txBody>
                     <a:bodyPr/>
@@ -6843,6 +6956,14 @@
                         </a:rPr>
                         <a:t>TodoColumnNames</a:t>
                       </a:r>
+                      <a:r>
+                        <a:rPr lang="en-US" sz="1200" dirty="0">
+                          <a:latin typeface="Malgun Gothic" charset="-127"/>
+                          <a:ea typeface="Malgun Gothic" charset="-127"/>
+                          <a:cs typeface="Malgun Gothic" charset="-127"/>
+                        </a:rPr>
+                        <a:t/>
+                      </a:r>
                       <a:br>
                         <a:rPr lang="en-US" sz="1200" dirty="0">
                           <a:latin typeface="Malgun Gothic" charset="-127"/>
@@ -6912,77 +7033,15 @@
                           <a:ea typeface="Malgun Gothic" charset="-127"/>
                           <a:cs typeface="Malgun Gothic" charset="-127"/>
                         </a:rPr>
-                        <a:t> database</a:t>
-                      </a:r>
-                    </a:p>
-                    <a:p>
-                      <a:r>
-                        <a:rPr lang="en-US" sz="1200" dirty="0">
-                          <a:latin typeface="Malgun Gothic" charset="-127"/>
-                          <a:ea typeface="Malgun Gothic" charset="-127"/>
-                          <a:cs typeface="Malgun Gothic" charset="-127"/>
-                        </a:rPr>
-                        <a:t>Private String </a:t>
-                      </a:r>
-                      <a:r>
-                        <a:rPr lang="en-US" sz="1200" dirty="0" err="1">
-                          <a:latin typeface="Malgun Gothic" charset="-127"/>
-                          <a:ea typeface="Malgun Gothic" charset="-127"/>
-                          <a:cs typeface="Malgun Gothic" charset="-127"/>
-                        </a:rPr>
-                        <a:t>subjectmatrix</a:t>
-                      </a:r>
-                      <a:r>
-                        <a:rPr lang="en-US" sz="1200" dirty="0">
-                          <a:latin typeface="Malgun Gothic" charset="-127"/>
-                          <a:ea typeface="Malgun Gothic" charset="-127"/>
-                          <a:cs typeface="Malgun Gothic" charset="-127"/>
-                        </a:rPr>
-                        <a:t>[][]</a:t>
-                      </a:r>
-                    </a:p>
-                    <a:p>
-                      <a:r>
-                        <a:rPr lang="en-US" sz="1200" dirty="0">
-                          <a:latin typeface="Malgun Gothic" charset="-127"/>
-                          <a:ea typeface="Malgun Gothic" charset="-127"/>
-                          <a:cs typeface="Malgun Gothic" charset="-127"/>
-                        </a:rPr>
-                        <a:t>Private String </a:t>
-                      </a:r>
-                      <a:r>
-                        <a:rPr lang="en-US" sz="1200" dirty="0" err="1">
-                          <a:latin typeface="Malgun Gothic" charset="-127"/>
-                          <a:ea typeface="Malgun Gothic" charset="-127"/>
-                          <a:cs typeface="Malgun Gothic" charset="-127"/>
-                        </a:rPr>
-                        <a:t>SubjectName</a:t>
-                      </a:r>
-                      <a:r>
-                        <a:rPr lang="en-US" sz="1200" dirty="0">
-                          <a:latin typeface="Malgun Gothic" charset="-127"/>
-                          <a:ea typeface="Malgun Gothic" charset="-127"/>
-                          <a:cs typeface="Malgun Gothic" charset="-127"/>
-                        </a:rPr>
-                        <a:t>[]</a:t>
-                      </a:r>
-                    </a:p>
-                    <a:p>
-                      <a:r>
-                        <a:rPr lang="en-US" sz="1200" dirty="0">
-                          <a:latin typeface="Malgun Gothic" charset="-127"/>
-                          <a:ea typeface="Malgun Gothic" charset="-127"/>
-                          <a:cs typeface="Malgun Gothic" charset="-127"/>
-                        </a:rPr>
-                        <a:t>Private String [][] </a:t>
-                      </a:r>
-                      <a:r>
-                        <a:rPr lang="en-US" sz="1200" dirty="0" err="1">
-                          <a:latin typeface="Malgun Gothic" charset="-127"/>
-                          <a:ea typeface="Malgun Gothic" charset="-127"/>
-                          <a:cs typeface="Malgun Gothic" charset="-127"/>
-                        </a:rPr>
-                        <a:t>TodoMatrix</a:t>
+                        <a:t> </a:t>
+                      </a:r>
+                      <a:r>
+                        <a:rPr lang="en-US" sz="1200" dirty="0" smtClean="0">
+                          <a:latin typeface="Malgun Gothic" charset="-127"/>
+                          <a:ea typeface="Malgun Gothic" charset="-127"/>
+                          <a:cs typeface="Malgun Gothic" charset="-127"/>
+                        </a:rPr>
+                        <a:t>database</a:t>
                       </a:r>
                       <a:endParaRPr lang="en-US" sz="1200" dirty="0">
                         <a:latin typeface="Malgun Gothic" charset="-127"/>
@@ -6990,40 +7049,93 @@
                         <a:cs typeface="Malgun Gothic" charset="-127"/>
                       </a:endParaRPr>
                     </a:p>
-                    <a:p>
-                      <a:r>
-                        <a:rPr lang="en-US" sz="1200" dirty="0">
-                          <a:latin typeface="Malgun Gothic" charset="-127"/>
-                          <a:ea typeface="Malgun Gothic" charset="-127"/>
-                          <a:cs typeface="Malgun Gothic" charset="-127"/>
-                        </a:rPr>
-                        <a:t>Private </a:t>
-                      </a:r>
-                      <a:r>
-                        <a:rPr lang="en-US" sz="1200" dirty="0" err="1">
-                          <a:latin typeface="Malgun Gothic" charset="-127"/>
-                          <a:ea typeface="Malgun Gothic" charset="-127"/>
-                          <a:cs typeface="Malgun Gothic" charset="-127"/>
-                        </a:rPr>
-                        <a:t>TodoElement</a:t>
-                      </a:r>
-                      <a:r>
-                        <a:rPr lang="en-US" sz="1200" dirty="0">
-                          <a:latin typeface="Malgun Gothic" charset="-127"/>
-                          <a:ea typeface="Malgun Gothic" charset="-127"/>
-                          <a:cs typeface="Malgun Gothic" charset="-127"/>
-                        </a:rPr>
-                        <a:t> </a:t>
-                      </a:r>
-                      <a:r>
-                        <a:rPr lang="en-US" sz="1200" dirty="0" err="1">
-                          <a:latin typeface="Malgun Gothic" charset="-127"/>
-                          <a:ea typeface="Malgun Gothic" charset="-127"/>
-                          <a:cs typeface="Malgun Gothic" charset="-127"/>
-                        </a:rPr>
-                        <a:t>selectedTodoElement</a:t>
-                      </a:r>
-                      <a:endParaRPr lang="en-US" sz="1200" dirty="0">
+                  </a:txBody>
+                  <a:tcPr>
+                    <a:lnR w="12700" cap="flat" cmpd="sng" algn="ctr">
+                      <a:solidFill>
+                        <a:schemeClr val="tx1"/>
+                      </a:solidFill>
+                      <a:prstDash val="solid"/>
+                      <a:round/>
+                      <a:headEnd type="none" w="med" len="med"/>
+                      <a:tailEnd type="none" w="med" len="med"/>
+                    </a:lnR>
+                  </a:tcPr>
+                </a:tc>
+                <a:tc>
+                  <a:txBody>
+                    <a:bodyPr/>
+                    <a:lstStyle/>
+                    <a:p>
+                      <a:r>
+                        <a:rPr lang="en-US" sz="1200" dirty="0" smtClean="0">
+                          <a:latin typeface="Malgun Gothic" charset="-127"/>
+                          <a:ea typeface="Malgun Gothic" charset="-127"/>
+                          <a:cs typeface="Malgun Gothic" charset="-127"/>
+                        </a:rPr>
+                        <a:t>Private String </a:t>
+                      </a:r>
+                      <a:r>
+                        <a:rPr lang="en-US" sz="1200" dirty="0" err="1" smtClean="0">
+                          <a:latin typeface="Malgun Gothic" charset="-127"/>
+                          <a:ea typeface="Malgun Gothic" charset="-127"/>
+                          <a:cs typeface="Malgun Gothic" charset="-127"/>
+                        </a:rPr>
+                        <a:t>subjectmatrix</a:t>
+                      </a:r>
+                      <a:r>
+                        <a:rPr lang="en-US" sz="1200" dirty="0" smtClean="0">
+                          <a:latin typeface="Malgun Gothic" charset="-127"/>
+                          <a:ea typeface="Malgun Gothic" charset="-127"/>
+                          <a:cs typeface="Malgun Gothic" charset="-127"/>
+                        </a:rPr>
+                        <a:t>[][]</a:t>
+                      </a:r>
+                    </a:p>
+                    <a:p>
+                      <a:r>
+                        <a:rPr lang="en-US" sz="1200" dirty="0" smtClean="0">
+                          <a:latin typeface="Malgun Gothic" charset="-127"/>
+                          <a:ea typeface="Malgun Gothic" charset="-127"/>
+                          <a:cs typeface="Malgun Gothic" charset="-127"/>
+                        </a:rPr>
+                        <a:t>Private String </a:t>
+                      </a:r>
+                      <a:r>
+                        <a:rPr lang="en-US" sz="1200" dirty="0" err="1" smtClean="0">
+                          <a:latin typeface="Malgun Gothic" charset="-127"/>
+                          <a:ea typeface="Malgun Gothic" charset="-127"/>
+                          <a:cs typeface="Malgun Gothic" charset="-127"/>
+                        </a:rPr>
+                        <a:t>SubjectName</a:t>
+                      </a:r>
+                      <a:r>
+                        <a:rPr lang="en-US" sz="1200" dirty="0" smtClean="0">
+                          <a:latin typeface="Malgun Gothic" charset="-127"/>
+                          <a:ea typeface="Malgun Gothic" charset="-127"/>
+                          <a:cs typeface="Malgun Gothic" charset="-127"/>
+                        </a:rPr>
+                        <a:t>[]</a:t>
+                      </a:r>
+                    </a:p>
+                    <a:p>
+                      <a:r>
+                        <a:rPr lang="en-US" sz="1200" dirty="0" smtClean="0">
+                          <a:latin typeface="Malgun Gothic" charset="-127"/>
+                          <a:ea typeface="Malgun Gothic" charset="-127"/>
+                          <a:cs typeface="Malgun Gothic" charset="-127"/>
+                        </a:rPr>
+                        <a:t>Private String [][] </a:t>
+                      </a:r>
+                      <a:r>
+                        <a:rPr lang="en-US" sz="1200" dirty="0" err="1" smtClean="0">
+                          <a:latin typeface="Malgun Gothic" charset="-127"/>
+                          <a:ea typeface="Malgun Gothic" charset="-127"/>
+                          <a:cs typeface="Malgun Gothic" charset="-127"/>
+                        </a:rPr>
+                        <a:t>TodoMatrix</a:t>
+                      </a:r>
+                      <a:endParaRPr lang="en-US" sz="1200" dirty="0" smtClean="0">
                         <a:latin typeface="Malgun Gothic" charset="-127"/>
                         <a:ea typeface="Malgun Gothic" charset="-127"/>
                         <a:cs typeface="Malgun Gothic" charset="-127"/>
@@ -7031,38 +7143,38 @@
                     </a:p>
                     <a:p>
                       <a:r>
-                        <a:rPr lang="en-US" sz="1200" dirty="0">
-                          <a:latin typeface="Malgun Gothic" charset="-127"/>
-                          <a:ea typeface="Malgun Gothic" charset="-127"/>
-                          <a:cs typeface="Malgun Gothic" charset="-127"/>
-                        </a:rPr>
-                        <a:t>Vector&lt;</a:t>
-                      </a:r>
-                      <a:r>
-                        <a:rPr lang="en-US" sz="1200" dirty="0" err="1">
-                          <a:latin typeface="Malgun Gothic" charset="-127"/>
-                          <a:ea typeface="Malgun Gothic" charset="-127"/>
-                          <a:cs typeface="Malgun Gothic" charset="-127"/>
-                        </a:rPr>
-                        <a:t>SubjectElement</a:t>
-                      </a:r>
-                      <a:r>
-                        <a:rPr lang="en-US" sz="1200" dirty="0">
-                          <a:latin typeface="Malgun Gothic" charset="-127"/>
-                          <a:ea typeface="Malgun Gothic" charset="-127"/>
-                          <a:cs typeface="Malgun Gothic" charset="-127"/>
-                        </a:rPr>
-                        <a:t>&gt; </a:t>
-                      </a:r>
-                      <a:r>
-                        <a:rPr lang="en-US" sz="1200" dirty="0" err="1">
-                          <a:latin typeface="Malgun Gothic" charset="-127"/>
-                          <a:ea typeface="Malgun Gothic" charset="-127"/>
-                          <a:cs typeface="Malgun Gothic" charset="-127"/>
-                        </a:rPr>
-                        <a:t>SubjectElement</a:t>
-                      </a:r>
-                      <a:endParaRPr lang="en-US" sz="1200" dirty="0">
+                        <a:rPr lang="en-US" sz="1200" dirty="0" smtClean="0">
+                          <a:latin typeface="Malgun Gothic" charset="-127"/>
+                          <a:ea typeface="Malgun Gothic" charset="-127"/>
+                          <a:cs typeface="Malgun Gothic" charset="-127"/>
+                        </a:rPr>
+                        <a:t>Private </a:t>
+                      </a:r>
+                      <a:r>
+                        <a:rPr lang="en-US" sz="1200" dirty="0" err="1" smtClean="0">
+                          <a:latin typeface="Malgun Gothic" charset="-127"/>
+                          <a:ea typeface="Malgun Gothic" charset="-127"/>
+                          <a:cs typeface="Malgun Gothic" charset="-127"/>
+                        </a:rPr>
+                        <a:t>TodoElement</a:t>
+                      </a:r>
+                      <a:r>
+                        <a:rPr lang="en-US" sz="1200" dirty="0" smtClean="0">
+                          <a:latin typeface="Malgun Gothic" charset="-127"/>
+                          <a:ea typeface="Malgun Gothic" charset="-127"/>
+                          <a:cs typeface="Malgun Gothic" charset="-127"/>
+                        </a:rPr>
+                        <a:t> </a:t>
+                      </a:r>
+                      <a:r>
+                        <a:rPr lang="en-US" sz="1200" dirty="0" err="1" smtClean="0">
+                          <a:latin typeface="Malgun Gothic" charset="-127"/>
+                          <a:ea typeface="Malgun Gothic" charset="-127"/>
+                          <a:cs typeface="Malgun Gothic" charset="-127"/>
+                        </a:rPr>
+                        <a:t>selectedTodoElement</a:t>
+                      </a:r>
+                      <a:endParaRPr lang="en-US" sz="1200" dirty="0" smtClean="0">
                         <a:latin typeface="Malgun Gothic" charset="-127"/>
                         <a:ea typeface="Malgun Gothic" charset="-127"/>
                         <a:cs typeface="Malgun Gothic" charset="-127"/>
@@ -7070,7 +7182,7 @@
                     </a:p>
                     <a:p>
                       <a:r>
-                        <a:rPr lang="en-US" sz="1200" dirty="0">
+                        <a:rPr lang="en-US" sz="1200" dirty="0" smtClean="0">
                           <a:latin typeface="Malgun Gothic" charset="-127"/>
                           <a:ea typeface="Malgun Gothic" charset="-127"/>
                           <a:cs typeface="Malgun Gothic" charset="-127"/>
@@ -7078,15 +7190,15 @@
                         <a:t>Vector&lt;</a:t>
                       </a:r>
                       <a:r>
-                        <a:rPr lang="en-US" sz="1200" dirty="0" err="1">
-                          <a:latin typeface="Malgun Gothic" charset="-127"/>
-                          <a:ea typeface="Malgun Gothic" charset="-127"/>
-                          <a:cs typeface="Malgun Gothic" charset="-127"/>
-                        </a:rPr>
-                        <a:t>TodoElement</a:t>
-                      </a:r>
-                      <a:r>
-                        <a:rPr lang="en-US" sz="1200" dirty="0">
+                        <a:rPr lang="en-US" sz="1200" dirty="0" err="1" smtClean="0">
+                          <a:latin typeface="Malgun Gothic" charset="-127"/>
+                          <a:ea typeface="Malgun Gothic" charset="-127"/>
+                          <a:cs typeface="Malgun Gothic" charset="-127"/>
+                        </a:rPr>
+                        <a:t>SubjectElement</a:t>
+                      </a:r>
+                      <a:r>
+                        <a:rPr lang="en-US" sz="1200" dirty="0" smtClean="0">
                           <a:latin typeface="Malgun Gothic" charset="-127"/>
                           <a:ea typeface="Malgun Gothic" charset="-127"/>
                           <a:cs typeface="Malgun Gothic" charset="-127"/>
@@ -7094,37 +7206,143 @@
                         <a:t>&gt; </a:t>
                       </a:r>
                       <a:r>
-                        <a:rPr lang="en-US" sz="1200" dirty="0" err="1">
-                          <a:latin typeface="Malgun Gothic" charset="-127"/>
-                          <a:ea typeface="Malgun Gothic" charset="-127"/>
-                          <a:cs typeface="Malgun Gothic" charset="-127"/>
-                        </a:rPr>
-                        <a:t>TodoElement</a:t>
-                      </a:r>
-                      <a:endParaRPr lang="en-US" sz="1200" dirty="0">
+                        <a:rPr lang="en-US" sz="1200" dirty="0" err="1" smtClean="0">
+                          <a:latin typeface="Malgun Gothic" charset="-127"/>
+                          <a:ea typeface="Malgun Gothic" charset="-127"/>
+                          <a:cs typeface="Malgun Gothic" charset="-127"/>
+                        </a:rPr>
+                        <a:t>SubjectElement</a:t>
+                      </a:r>
+                      <a:endParaRPr lang="en-US" sz="1200" dirty="0" smtClean="0">
                         <a:latin typeface="Malgun Gothic" charset="-127"/>
                         <a:ea typeface="Malgun Gothic" charset="-127"/>
                         <a:cs typeface="Malgun Gothic" charset="-127"/>
                       </a:endParaRPr>
                     </a:p>
                     <a:p>
-                      <a:endParaRPr lang="en-US" sz="1200" dirty="0">
+                      <a:r>
+                        <a:rPr lang="en-US" sz="1200" dirty="0" smtClean="0">
+                          <a:latin typeface="Malgun Gothic" charset="-127"/>
+                          <a:ea typeface="Malgun Gothic" charset="-127"/>
+                          <a:cs typeface="Malgun Gothic" charset="-127"/>
+                        </a:rPr>
+                        <a:t>Vector&lt;</a:t>
+                      </a:r>
+                      <a:r>
+                        <a:rPr lang="en-US" sz="1200" dirty="0" err="1" smtClean="0">
+                          <a:latin typeface="Malgun Gothic" charset="-127"/>
+                          <a:ea typeface="Malgun Gothic" charset="-127"/>
+                          <a:cs typeface="Malgun Gothic" charset="-127"/>
+                        </a:rPr>
+                        <a:t>TodoElement</a:t>
+                      </a:r>
+                      <a:r>
+                        <a:rPr lang="en-US" sz="1200" dirty="0" smtClean="0">
+                          <a:latin typeface="Malgun Gothic" charset="-127"/>
+                          <a:ea typeface="Malgun Gothic" charset="-127"/>
+                          <a:cs typeface="Malgun Gothic" charset="-127"/>
+                        </a:rPr>
+                        <a:t>&gt; </a:t>
+                      </a:r>
+                      <a:r>
+                        <a:rPr lang="en-US" sz="1200" dirty="0" err="1" smtClean="0">
+                          <a:latin typeface="Malgun Gothic" charset="-127"/>
+                          <a:ea typeface="Malgun Gothic" charset="-127"/>
+                          <a:cs typeface="Malgun Gothic" charset="-127"/>
+                        </a:rPr>
+                        <a:t>TodoElement</a:t>
+                      </a:r>
+                      <a:endParaRPr lang="en-US" sz="1200" dirty="0" smtClean="0">
                         <a:latin typeface="Malgun Gothic" charset="-127"/>
                         <a:ea typeface="Malgun Gothic" charset="-127"/>
                         <a:cs typeface="Malgun Gothic" charset="-127"/>
                       </a:endParaRPr>
                     </a:p>
+                    <a:p>
+                      <a:r>
+                        <a:rPr lang="en-US" sz="1200" dirty="0" err="1" smtClean="0">
+                          <a:latin typeface="Malgun Gothic" charset="-127"/>
+                          <a:ea typeface="Malgun Gothic" charset="-127"/>
+                          <a:cs typeface="Malgun Gothic" charset="-127"/>
+                        </a:rPr>
+                        <a:t>HashMap</a:t>
+                      </a:r>
+                      <a:r>
+                        <a:rPr lang="en-US" sz="1200" dirty="0" smtClean="0">
+                          <a:latin typeface="Malgun Gothic" charset="-127"/>
+                          <a:ea typeface="Malgun Gothic" charset="-127"/>
+                          <a:cs typeface="Malgun Gothic" charset="-127"/>
+                        </a:rPr>
+                        <a:t>&lt;Integer, Integer&gt; </a:t>
+                      </a:r>
+                      <a:r>
+                        <a:rPr lang="en-US" sz="1200" dirty="0" err="1" smtClean="0">
+                          <a:latin typeface="Malgun Gothic" charset="-127"/>
+                          <a:ea typeface="Malgun Gothic" charset="-127"/>
+                          <a:cs typeface="Malgun Gothic" charset="-127"/>
+                        </a:rPr>
+                        <a:t>HideHashMap</a:t>
+                      </a:r>
+                      <a:endParaRPr lang="en-US" sz="1200" dirty="0" smtClean="0">
+                        <a:latin typeface="Malgun Gothic" charset="-127"/>
+                        <a:ea typeface="Malgun Gothic" charset="-127"/>
+                        <a:cs typeface="Malgun Gothic" charset="-127"/>
+                      </a:endParaRPr>
+                    </a:p>
+                    <a:p>
+                      <a:r>
+                        <a:rPr lang="en-US" sz="1200" dirty="0" smtClean="0">
+                          <a:latin typeface="Malgun Gothic" charset="-127"/>
+                          <a:ea typeface="Malgun Gothic" charset="-127"/>
+                          <a:cs typeface="Malgun Gothic" charset="-127"/>
+                        </a:rPr>
+                        <a:t>public </a:t>
+                      </a:r>
+                      <a:r>
+                        <a:rPr lang="en-US" sz="1200" dirty="0" err="1" smtClean="0">
+                          <a:latin typeface="Malgun Gothic" charset="-127"/>
+                          <a:ea typeface="Malgun Gothic" charset="-127"/>
+                          <a:cs typeface="Malgun Gothic" charset="-127"/>
+                        </a:rPr>
+                        <a:t>boolean</a:t>
+                      </a:r>
+                      <a:r>
+                        <a:rPr lang="en-US" sz="1200" dirty="0" smtClean="0">
+                          <a:latin typeface="Malgun Gothic" charset="-127"/>
+                          <a:ea typeface="Malgun Gothic" charset="-127"/>
+                          <a:cs typeface="Malgun Gothic" charset="-127"/>
+                        </a:rPr>
+                        <a:t> Hide</a:t>
+                      </a:r>
+                    </a:p>
+                    <a:p>
+                      <a:endParaRPr lang="en-US" sz="1200" dirty="0" smtClean="0">
+                        <a:latin typeface="Malgun Gothic" charset="-127"/>
+                        <a:ea typeface="Malgun Gothic" charset="-127"/>
+                        <a:cs typeface="Malgun Gothic" charset="-127"/>
+                      </a:endParaRPr>
+                    </a:p>
                   </a:txBody>
-                  <a:tcPr/>
+                  <a:tcPr>
+                    <a:lnL w="12700" cap="flat" cmpd="sng" algn="ctr">
+                      <a:solidFill>
+                        <a:schemeClr val="tx1"/>
+                      </a:solidFill>
+                      <a:prstDash val="solid"/>
+                      <a:round/>
+                      <a:headEnd type="none" w="med" len="med"/>
+                      <a:tailEnd type="none" w="med" len="med"/>
+                    </a:lnL>
+                  </a:tcPr>
                 </a:tc>
                 <a:extLst>
                   <a:ext uri="{0D108BD9-81ED-4DB2-BD59-A6C34878D82A}">
-                    <a16:rowId xmlns:a16="http://schemas.microsoft.com/office/drawing/2014/main" val="10001"/>
+                    <a16:rowId xmlns="" xmlns:a16="http://schemas.microsoft.com/office/drawing/2014/main" val="10001"/>
                   </a:ext>
                 </a:extLst>
               </a:tr>
-              <a:tr h="2290108">
-                <a:tc>
+              <a:tr h="2664499">
+                <a:tc gridSpan="2">
                   <a:txBody>
                     <a:bodyPr/>
                     <a:lstStyle/>
@@ -7929,20 +8147,180 @@
                         <a:t>MatrixTodoElement</a:t>
                       </a:r>
                       <a:r>
-                        <a:rPr lang="en-US" sz="1200" baseline="0" dirty="0">
+                        <a:rPr lang="en-US" sz="1200" baseline="0" dirty="0" smtClean="0">
                           <a:latin typeface="Malgun Gothic" charset="-127"/>
                           <a:ea typeface="Malgun Gothic" charset="-127"/>
                           <a:cs typeface="Malgun Gothic" charset="-127"/>
                         </a:rPr>
                         <a:t>()</a:t>
                       </a:r>
+                    </a:p>
+                    <a:p>
+                      <a:pPr marL="0" marR="0" indent="0" algn="l" defTabSz="914400" rtl="0" eaLnBrk="1" fontAlgn="auto" latinLnBrk="1" hangingPunct="1">
+                        <a:lnSpc>
+                          <a:spcPct val="100000"/>
+                        </a:lnSpc>
+                        <a:spcBef>
+                          <a:spcPts val="0"/>
+                        </a:spcBef>
+                        <a:spcAft>
+                          <a:spcPts val="0"/>
+                        </a:spcAft>
+                        <a:buClrTx/>
+                        <a:buSzTx/>
+                        <a:buFontTx/>
+                        <a:buNone/>
+                        <a:tabLst/>
+                        <a:defRPr/>
+                      </a:pPr>
+                      <a:r>
+                        <a:rPr lang="en-US" sz="1200" baseline="0" dirty="0" smtClean="0">
+                          <a:latin typeface="Malgun Gothic" charset="-127"/>
+                          <a:ea typeface="Malgun Gothic" charset="-127"/>
+                          <a:cs typeface="Malgun Gothic" charset="-127"/>
+                        </a:rPr>
+                        <a:t>public String[][] </a:t>
+                      </a:r>
+                      <a:r>
+                        <a:rPr lang="en-US" sz="1200" baseline="0" dirty="0" err="1" smtClean="0">
+                          <a:latin typeface="Malgun Gothic" charset="-127"/>
+                          <a:ea typeface="Malgun Gothic" charset="-127"/>
+                          <a:cs typeface="Malgun Gothic" charset="-127"/>
+                        </a:rPr>
+                        <a:t>MatrixHideShowCompleted</a:t>
+                      </a:r>
+                      <a:r>
+                        <a:rPr lang="en-US" sz="1200" baseline="0" dirty="0" smtClean="0">
+                          <a:latin typeface="Malgun Gothic" charset="-127"/>
+                          <a:ea typeface="Malgun Gothic" charset="-127"/>
+                          <a:cs typeface="Malgun Gothic" charset="-127"/>
+                        </a:rPr>
+                        <a:t>()</a:t>
+                      </a:r>
+                    </a:p>
+                    <a:p>
+                      <a:pPr marL="0" marR="0" indent="0" algn="l" defTabSz="914400" rtl="0" eaLnBrk="1" fontAlgn="auto" latinLnBrk="1" hangingPunct="1">
+                        <a:lnSpc>
+                          <a:spcPct val="100000"/>
+                        </a:lnSpc>
+                        <a:spcBef>
+                          <a:spcPts val="0"/>
+                        </a:spcBef>
+                        <a:spcAft>
+                          <a:spcPts val="0"/>
+                        </a:spcAft>
+                        <a:buClrTx/>
+                        <a:buSzTx/>
+                        <a:buFontTx/>
+                        <a:buNone/>
+                        <a:tabLst/>
+                        <a:defRPr/>
+                      </a:pPr>
+                      <a:r>
+                        <a:rPr lang="en-US" sz="1200" baseline="0" dirty="0" smtClean="0">
+                          <a:latin typeface="Malgun Gothic" charset="-127"/>
+                          <a:ea typeface="Malgun Gothic" charset="-127"/>
+                          <a:cs typeface="Malgun Gothic" charset="-127"/>
+                        </a:rPr>
+                        <a:t>public </a:t>
+                      </a:r>
+                      <a:r>
+                        <a:rPr lang="en-US" sz="1200" baseline="0" dirty="0" err="1" smtClean="0">
+                          <a:latin typeface="Malgun Gothic" charset="-127"/>
+                          <a:ea typeface="Malgun Gothic" charset="-127"/>
+                          <a:cs typeface="Malgun Gothic" charset="-127"/>
+                        </a:rPr>
+                        <a:t>int</a:t>
+                      </a:r>
+                      <a:r>
+                        <a:rPr lang="en-US" sz="1200" baseline="0" dirty="0" smtClean="0">
+                          <a:latin typeface="Malgun Gothic" charset="-127"/>
+                          <a:ea typeface="Malgun Gothic" charset="-127"/>
+                          <a:cs typeface="Malgun Gothic" charset="-127"/>
+                        </a:rPr>
+                        <a:t> </a:t>
+                      </a:r>
+                      <a:r>
+                        <a:rPr lang="en-US" sz="1200" baseline="0" dirty="0" err="1" smtClean="0">
+                          <a:latin typeface="Malgun Gothic" charset="-127"/>
+                          <a:ea typeface="Malgun Gothic" charset="-127"/>
+                          <a:cs typeface="Malgun Gothic" charset="-127"/>
+                        </a:rPr>
+                        <a:t>SizeofMatrix</a:t>
+                      </a:r>
+                      <a:r>
+                        <a:rPr lang="en-US" sz="1200" baseline="0" dirty="0" smtClean="0">
+                          <a:latin typeface="Malgun Gothic" charset="-127"/>
+                          <a:ea typeface="Malgun Gothic" charset="-127"/>
+                          <a:cs typeface="Malgun Gothic" charset="-127"/>
+                        </a:rPr>
+                        <a:t>()</a:t>
+                      </a:r>
+                    </a:p>
+                    <a:p>
+                      <a:pPr marL="0" marR="0" indent="0" algn="l" defTabSz="914400" rtl="0" eaLnBrk="1" fontAlgn="auto" latinLnBrk="1" hangingPunct="1">
+                        <a:lnSpc>
+                          <a:spcPct val="100000"/>
+                        </a:lnSpc>
+                        <a:spcBef>
+                          <a:spcPts val="0"/>
+                        </a:spcBef>
+                        <a:spcAft>
+                          <a:spcPts val="0"/>
+                        </a:spcAft>
+                        <a:buClrTx/>
+                        <a:buSzTx/>
+                        <a:buFontTx/>
+                        <a:buNone/>
+                        <a:tabLst/>
+                        <a:defRPr/>
+                      </a:pPr>
+                      <a:endParaRPr lang="en-US" sz="1200" baseline="0" dirty="0" smtClean="0">
+                        <a:latin typeface="Malgun Gothic" charset="-127"/>
+                        <a:ea typeface="Malgun Gothic" charset="-127"/>
+                        <a:cs typeface="Malgun Gothic" charset="-127"/>
+                      </a:endParaRPr>
+                    </a:p>
+                    <a:p>
+                      <a:pPr marL="0" marR="0" indent="0" algn="l" defTabSz="914400" rtl="0" eaLnBrk="1" fontAlgn="auto" latinLnBrk="1" hangingPunct="1">
+                        <a:lnSpc>
+                          <a:spcPct val="100000"/>
+                        </a:lnSpc>
+                        <a:spcBef>
+                          <a:spcPts val="0"/>
+                        </a:spcBef>
+                        <a:spcAft>
+                          <a:spcPts val="0"/>
+                        </a:spcAft>
+                        <a:buClrTx/>
+                        <a:buSzTx/>
+                        <a:buFontTx/>
+                        <a:buNone/>
+                        <a:tabLst/>
+                        <a:defRPr/>
+                      </a:pPr>
+                      <a:endParaRPr lang="en-US" sz="1200" baseline="0" dirty="0">
+                        <a:latin typeface="Malgun Gothic" charset="-127"/>
+                        <a:ea typeface="Malgun Gothic" charset="-127"/>
+                        <a:cs typeface="Malgun Gothic" charset="-127"/>
+                      </a:endParaRPr>
+                    </a:p>
+                  </a:txBody>
+                  <a:tcPr/>
+                </a:tc>
+                <a:tc hMerge="1">
+                  <a:txBody>
+                    <a:bodyPr/>
+                    <a:lstStyle/>
+                    <a:p>
+                      <a:endParaRPr lang="en-US"/>
                     </a:p>
                   </a:txBody>
                   <a:tcPr/>
                 </a:tc>
                 <a:extLst>
                   <a:ext uri="{0D108BD9-81ED-4DB2-BD59-A6C34878D82A}">
-                    <a16:rowId xmlns:a16="http://schemas.microsoft.com/office/drawing/2014/main" val="10002"/>
+                    <a16:rowId xmlns="" xmlns:a16="http://schemas.microsoft.com/office/drawing/2014/main" val="10002"/>
                   </a:ext>
                 </a:extLst>
               </a:tr>
@@ -8166,7 +8544,7 @@
             <p:ph idx="1"/>
             <p:extLst>
               <p:ext uri="{D42A27DB-BD31-4B8C-83A1-F6EECF244321}">
-                <p14:modId xmlns:p14="http://schemas.microsoft.com/office/powerpoint/2010/main" val="4037696652"/>
+                <p14:modId xmlns:p14="http://schemas.microsoft.com/office/powerpoint/2010/main" val="1879055444"/>
               </p:ext>
             </p:extLst>
           </p:nvPr>
@@ -8185,28 +8563,28 @@
                 <a:gridCol w="2145506">
                   <a:extLst>
                     <a:ext uri="{9D8B030D-6E8A-4147-A177-3AD203B41FA5}">
-                      <a16:colId xmlns:a16="http://schemas.microsoft.com/office/drawing/2014/main" val="20000"/>
+                      <a16:colId xmlns="" xmlns:a16="http://schemas.microsoft.com/office/drawing/2014/main" val="20000"/>
                     </a:ext>
                   </a:extLst>
                 </a:gridCol>
                 <a:gridCol w="2145506">
                   <a:extLst>
                     <a:ext uri="{9D8B030D-6E8A-4147-A177-3AD203B41FA5}">
-                      <a16:colId xmlns:a16="http://schemas.microsoft.com/office/drawing/2014/main" val="20001"/>
+                      <a16:colId xmlns="" xmlns:a16="http://schemas.microsoft.com/office/drawing/2014/main" val="20001"/>
                     </a:ext>
                   </a:extLst>
                 </a:gridCol>
                 <a:gridCol w="2145506">
                   <a:extLst>
                     <a:ext uri="{9D8B030D-6E8A-4147-A177-3AD203B41FA5}">
-                      <a16:colId xmlns:a16="http://schemas.microsoft.com/office/drawing/2014/main" val="20002"/>
+                      <a16:colId xmlns="" xmlns:a16="http://schemas.microsoft.com/office/drawing/2014/main" val="20002"/>
                     </a:ext>
                   </a:extLst>
                 </a:gridCol>
                 <a:gridCol w="2145506">
                   <a:extLst>
                     <a:ext uri="{9D8B030D-6E8A-4147-A177-3AD203B41FA5}">
-                      <a16:colId xmlns:a16="http://schemas.microsoft.com/office/drawing/2014/main" val="20003"/>
+                      <a16:colId xmlns="" xmlns:a16="http://schemas.microsoft.com/office/drawing/2014/main" val="20003"/>
                     </a:ext>
                   </a:extLst>
                 </a:gridCol>
@@ -8334,7 +8712,7 @@
                 </a:tc>
                 <a:extLst>
                   <a:ext uri="{0D108BD9-81ED-4DB2-BD59-A6C34878D82A}">
-                    <a16:rowId xmlns:a16="http://schemas.microsoft.com/office/drawing/2014/main" val="10000"/>
+                    <a16:rowId xmlns="" xmlns:a16="http://schemas.microsoft.com/office/drawing/2014/main" val="10000"/>
                   </a:ext>
                 </a:extLst>
               </a:tr>
@@ -8478,7 +8856,7 @@
                 </a:tc>
                 <a:extLst>
                   <a:ext uri="{0D108BD9-81ED-4DB2-BD59-A6C34878D82A}">
-                    <a16:rowId xmlns:a16="http://schemas.microsoft.com/office/drawing/2014/main" val="10001"/>
+                    <a16:rowId xmlns="" xmlns:a16="http://schemas.microsoft.com/office/drawing/2014/main" val="10001"/>
                   </a:ext>
                 </a:extLst>
               </a:tr>
@@ -8605,7 +8983,7 @@
                 </a:tc>
                 <a:extLst>
                   <a:ext uri="{0D108BD9-81ED-4DB2-BD59-A6C34878D82A}">
-                    <a16:rowId xmlns:a16="http://schemas.microsoft.com/office/drawing/2014/main" val="10002"/>
+                    <a16:rowId xmlns="" xmlns:a16="http://schemas.microsoft.com/office/drawing/2014/main" val="10002"/>
                   </a:ext>
                 </a:extLst>
               </a:tr>
@@ -8755,7 +9133,7 @@
                 </a:tc>
                 <a:extLst>
                   <a:ext uri="{0D108BD9-81ED-4DB2-BD59-A6C34878D82A}">
-                    <a16:rowId xmlns:a16="http://schemas.microsoft.com/office/drawing/2014/main" val="10003"/>
+                    <a16:rowId xmlns="" xmlns:a16="http://schemas.microsoft.com/office/drawing/2014/main" val="10003"/>
                   </a:ext>
                 </a:extLst>
               </a:tr>
@@ -8896,7 +9274,7 @@
                 </a:tc>
                 <a:extLst>
                   <a:ext uri="{0D108BD9-81ED-4DB2-BD59-A6C34878D82A}">
-                    <a16:rowId xmlns:a16="http://schemas.microsoft.com/office/drawing/2014/main" val="10004"/>
+                    <a16:rowId xmlns="" xmlns:a16="http://schemas.microsoft.com/office/drawing/2014/main" val="10004"/>
                   </a:ext>
                 </a:extLst>
               </a:tr>
@@ -9057,7 +9435,7 @@
                 </a:tc>
                 <a:extLst>
                   <a:ext uri="{0D108BD9-81ED-4DB2-BD59-A6C34878D82A}">
-                    <a16:rowId xmlns:a16="http://schemas.microsoft.com/office/drawing/2014/main" val="10005"/>
+                    <a16:rowId xmlns="" xmlns:a16="http://schemas.microsoft.com/office/drawing/2014/main" val="10005"/>
                   </a:ext>
                 </a:extLst>
               </a:tr>
@@ -9174,7 +9552,7 @@
                 </a:tc>
                 <a:extLst>
                   <a:ext uri="{0D108BD9-81ED-4DB2-BD59-A6C34878D82A}">
-                    <a16:rowId xmlns:a16="http://schemas.microsoft.com/office/drawing/2014/main" val="10006"/>
+                    <a16:rowId xmlns="" xmlns:a16="http://schemas.microsoft.com/office/drawing/2014/main" val="10006"/>
                   </a:ext>
                 </a:extLst>
               </a:tr>
@@ -9185,7 +9563,17 @@
                     <a:lstStyle/>
                     <a:p>
                       <a:pPr algn="ctr" latinLnBrk="1"/>
-                      <a:endParaRPr lang="ko-KR" altLang="en-US" sz="1200" b="0">
+                      <a:r>
+                        <a:rPr lang="en-US" altLang="ko-KR" sz="1200" b="0" dirty="0" smtClean="0">
+                          <a:solidFill>
+                            <a:schemeClr val="tx1"/>
+                          </a:solidFill>
+                          <a:latin typeface="맑은 고딕" pitchFamily="50" charset="-127"/>
+                          <a:ea typeface="맑은 고딕" pitchFamily="50" charset="-127"/>
+                        </a:rPr>
+                        <a:t>2017.06.05</a:t>
+                      </a:r>
+                      <a:endParaRPr lang="ko-KR" altLang="en-US" sz="1200" b="0" dirty="0">
                         <a:solidFill>
                           <a:schemeClr val="tx1"/>
                         </a:solidFill>
@@ -9206,6 +9594,16 @@
                     <a:lstStyle/>
                     <a:p>
                       <a:pPr algn="ctr" latinLnBrk="1"/>
+                      <a:r>
+                        <a:rPr lang="en-US" altLang="ko-KR" sz="1200" b="0" dirty="0" smtClean="0">
+                          <a:solidFill>
+                            <a:schemeClr val="tx1"/>
+                          </a:solidFill>
+                          <a:latin typeface="맑은 고딕" pitchFamily="50" charset="-127"/>
+                          <a:ea typeface="맑은 고딕" pitchFamily="50" charset="-127"/>
+                        </a:rPr>
+                        <a:t>V2.0.0</a:t>
+                      </a:r>
                       <a:endParaRPr lang="ko-KR" altLang="en-US" sz="1200" b="0" dirty="0">
                         <a:solidFill>
                           <a:schemeClr val="tx1"/>
@@ -9226,7 +9624,67 @@
                     <a:bodyPr/>
                     <a:lstStyle/>
                     <a:p>
-                      <a:pPr latinLnBrk="1"/>
+                      <a:pPr algn="ctr" latinLnBrk="1"/>
+                      <a:r>
+                        <a:rPr lang="ko-KR" altLang="en-US" sz="1200" b="0" dirty="0" smtClean="0">
+                          <a:solidFill>
+                            <a:schemeClr val="tx1"/>
+                          </a:solidFill>
+                          <a:latin typeface="맑은 고딕" pitchFamily="50" charset="-127"/>
+                          <a:ea typeface="맑은 고딕" pitchFamily="50" charset="-127"/>
+                        </a:rPr>
+                        <a:t>보이기</a:t>
+                      </a:r>
+                      <a:r>
+                        <a:rPr lang="en-US" altLang="ko-KR" sz="1200" b="0" dirty="0" smtClean="0">
+                          <a:solidFill>
+                            <a:schemeClr val="tx1"/>
+                          </a:solidFill>
+                          <a:latin typeface="맑은 고딕" pitchFamily="50" charset="-127"/>
+                          <a:ea typeface="맑은 고딕" pitchFamily="50" charset="-127"/>
+                        </a:rPr>
+                        <a:t>/</a:t>
+                      </a:r>
+                      <a:r>
+                        <a:rPr lang="ko-KR" altLang="en-US" sz="1200" b="0" dirty="0" smtClean="0">
+                          <a:solidFill>
+                            <a:schemeClr val="tx1"/>
+                          </a:solidFill>
+                          <a:latin typeface="맑은 고딕" pitchFamily="50" charset="-127"/>
+                          <a:ea typeface="맑은 고딕" pitchFamily="50" charset="-127"/>
+                        </a:rPr>
+                        <a:t>숨기기</a:t>
+                      </a:r>
+                      <a:r>
+                        <a:rPr lang="en-US" altLang="ko-KR" sz="1200" b="0" baseline="0" dirty="0" smtClean="0">
+                          <a:solidFill>
+                            <a:schemeClr val="tx1"/>
+                          </a:solidFill>
+                          <a:latin typeface="맑은 고딕" pitchFamily="50" charset="-127"/>
+                          <a:ea typeface="맑은 고딕" pitchFamily="50" charset="-127"/>
+                        </a:rPr>
+                        <a:t> </a:t>
+                      </a:r>
+                      <a:r>
+                        <a:rPr lang="ko-KR" altLang="en-US" sz="1200" b="0" baseline="0" dirty="0" smtClean="0">
+                          <a:solidFill>
+                            <a:schemeClr val="tx1"/>
+                          </a:solidFill>
+                          <a:latin typeface="맑은 고딕" pitchFamily="50" charset="-127"/>
+                          <a:ea typeface="맑은 고딕" pitchFamily="50" charset="-127"/>
+                        </a:rPr>
+                        <a:t>기능</a:t>
+                      </a:r>
+                      <a:r>
+                        <a:rPr lang="ko-KR" altLang="en-US" sz="1200" b="0" dirty="0" smtClean="0">
+                          <a:solidFill>
+                            <a:schemeClr val="tx1"/>
+                          </a:solidFill>
+                          <a:latin typeface="맑은 고딕" pitchFamily="50" charset="-127"/>
+                          <a:ea typeface="맑은 고딕" pitchFamily="50" charset="-127"/>
+                        </a:rPr>
+                        <a:t> 설계</a:t>
+                      </a:r>
                       <a:endParaRPr lang="ko-KR" altLang="en-US" sz="1200" b="0" dirty="0">
                         <a:solidFill>
                           <a:schemeClr val="tx1"/>
@@ -9248,6 +9706,16 @@
                     <a:lstStyle/>
                     <a:p>
                       <a:pPr algn="ctr" latinLnBrk="1"/>
+                      <a:r>
+                        <a:rPr lang="ko-KR" altLang="en-US" sz="1200" b="0" dirty="0" smtClean="0">
+                          <a:solidFill>
+                            <a:schemeClr val="tx1"/>
+                          </a:solidFill>
+                          <a:latin typeface="맑은 고딕" pitchFamily="50" charset="-127"/>
+                          <a:ea typeface="맑은 고딕" pitchFamily="50" charset="-127"/>
+                        </a:rPr>
+                        <a:t>이연재</a:t>
+                      </a:r>
                       <a:endParaRPr lang="ko-KR" altLang="en-US" sz="1200" b="0" dirty="0">
                         <a:solidFill>
                           <a:schemeClr val="tx1"/>
@@ -9265,7 +9733,7 @@
                 </a:tc>
                 <a:extLst>
                   <a:ext uri="{0D108BD9-81ED-4DB2-BD59-A6C34878D82A}">
-                    <a16:rowId xmlns:a16="http://schemas.microsoft.com/office/drawing/2014/main" val="10007"/>
+                    <a16:rowId xmlns="" xmlns:a16="http://schemas.microsoft.com/office/drawing/2014/main" val="10007"/>
                   </a:ext>
                 </a:extLst>
               </a:tr>
@@ -9376,7 +9844,7 @@
                 <a:gridCol w="7556500">
                   <a:extLst>
                     <a:ext uri="{9D8B030D-6E8A-4147-A177-3AD203B41FA5}">
-                      <a16:colId xmlns:a16="http://schemas.microsoft.com/office/drawing/2014/main" val="20000"/>
+                      <a16:colId xmlns="" xmlns:a16="http://schemas.microsoft.com/office/drawing/2014/main" val="20000"/>
                     </a:ext>
                   </a:extLst>
                 </a:gridCol>
@@ -9401,7 +9869,7 @@
                 </a:tc>
                 <a:extLst>
                   <a:ext uri="{0D108BD9-81ED-4DB2-BD59-A6C34878D82A}">
-                    <a16:rowId xmlns:a16="http://schemas.microsoft.com/office/drawing/2014/main" val="10000"/>
+                    <a16:rowId xmlns="" xmlns:a16="http://schemas.microsoft.com/office/drawing/2014/main" val="10000"/>
                   </a:ext>
                 </a:extLst>
               </a:tr>
@@ -9446,7 +9914,7 @@
                 </a:tc>
                 <a:extLst>
                   <a:ext uri="{0D108BD9-81ED-4DB2-BD59-A6C34878D82A}">
-                    <a16:rowId xmlns:a16="http://schemas.microsoft.com/office/drawing/2014/main" val="10001"/>
+                    <a16:rowId xmlns="" xmlns:a16="http://schemas.microsoft.com/office/drawing/2014/main" val="10001"/>
                   </a:ext>
                 </a:extLst>
               </a:tr>
@@ -9486,7 +9954,7 @@
                 </a:tc>
                 <a:extLst>
                   <a:ext uri="{0D108BD9-81ED-4DB2-BD59-A6C34878D82A}">
-                    <a16:rowId xmlns:a16="http://schemas.microsoft.com/office/drawing/2014/main" val="10002"/>
+                    <a16:rowId xmlns="" xmlns:a16="http://schemas.microsoft.com/office/drawing/2014/main" val="10002"/>
                   </a:ext>
                 </a:extLst>
               </a:tr>
@@ -9552,7 +10020,7 @@
                 <a:gridCol w="7556500">
                   <a:extLst>
                     <a:ext uri="{9D8B030D-6E8A-4147-A177-3AD203B41FA5}">
-                      <a16:colId xmlns:a16="http://schemas.microsoft.com/office/drawing/2014/main" val="20000"/>
+                      <a16:colId xmlns="" xmlns:a16="http://schemas.microsoft.com/office/drawing/2014/main" val="20000"/>
                     </a:ext>
                   </a:extLst>
                 </a:gridCol>
@@ -9577,7 +10045,7 @@
                 </a:tc>
                 <a:extLst>
                   <a:ext uri="{0D108BD9-81ED-4DB2-BD59-A6C34878D82A}">
-                    <a16:rowId xmlns:a16="http://schemas.microsoft.com/office/drawing/2014/main" val="10000"/>
+                    <a16:rowId xmlns="" xmlns:a16="http://schemas.microsoft.com/office/drawing/2014/main" val="10000"/>
                   </a:ext>
                 </a:extLst>
               </a:tr>
@@ -9775,7 +10243,7 @@
                 </a:tc>
                 <a:extLst>
                   <a:ext uri="{0D108BD9-81ED-4DB2-BD59-A6C34878D82A}">
-                    <a16:rowId xmlns:a16="http://schemas.microsoft.com/office/drawing/2014/main" val="10001"/>
+                    <a16:rowId xmlns="" xmlns:a16="http://schemas.microsoft.com/office/drawing/2014/main" val="10001"/>
                   </a:ext>
                 </a:extLst>
               </a:tr>
@@ -9849,7 +10317,7 @@
                 </a:tc>
                 <a:extLst>
                   <a:ext uri="{0D108BD9-81ED-4DB2-BD59-A6C34878D82A}">
-                    <a16:rowId xmlns:a16="http://schemas.microsoft.com/office/drawing/2014/main" val="10002"/>
+                    <a16:rowId xmlns="" xmlns:a16="http://schemas.microsoft.com/office/drawing/2014/main" val="10002"/>
                   </a:ext>
                 </a:extLst>
               </a:tr>
@@ -10001,14 +10469,14 @@
                 <a:gridCol w="3872696">
                   <a:extLst>
                     <a:ext uri="{9D8B030D-6E8A-4147-A177-3AD203B41FA5}">
-                      <a16:colId xmlns:a16="http://schemas.microsoft.com/office/drawing/2014/main" val="20000"/>
+                      <a16:colId xmlns="" xmlns:a16="http://schemas.microsoft.com/office/drawing/2014/main" val="20000"/>
                     </a:ext>
                   </a:extLst>
                 </a:gridCol>
                 <a:gridCol w="3683804">
                   <a:extLst>
                     <a:ext uri="{9D8B030D-6E8A-4147-A177-3AD203B41FA5}">
-                      <a16:colId xmlns:a16="http://schemas.microsoft.com/office/drawing/2014/main" val="1913853126"/>
+                      <a16:colId xmlns="" xmlns:a16="http://schemas.microsoft.com/office/drawing/2014/main" val="1913853126"/>
                     </a:ext>
                   </a:extLst>
                 </a:gridCol>
@@ -10062,7 +10530,7 @@
                 </a:tc>
                 <a:extLst>
                   <a:ext uri="{0D108BD9-81ED-4DB2-BD59-A6C34878D82A}">
-                    <a16:rowId xmlns:a16="http://schemas.microsoft.com/office/drawing/2014/main" val="10000"/>
+                    <a16:rowId xmlns="" xmlns:a16="http://schemas.microsoft.com/office/drawing/2014/main" val="10000"/>
                   </a:ext>
                 </a:extLst>
               </a:tr>
@@ -10554,7 +11022,7 @@
                 </a:tc>
                 <a:extLst>
                   <a:ext uri="{0D108BD9-81ED-4DB2-BD59-A6C34878D82A}">
-                    <a16:rowId xmlns:a16="http://schemas.microsoft.com/office/drawing/2014/main" val="10001"/>
+                    <a16:rowId xmlns="" xmlns:a16="http://schemas.microsoft.com/office/drawing/2014/main" val="10001"/>
                   </a:ext>
                 </a:extLst>
               </a:tr>
@@ -10689,7 +11157,7 @@
                 </a:tc>
                 <a:extLst>
                   <a:ext uri="{0D108BD9-81ED-4DB2-BD59-A6C34878D82A}">
-                    <a16:rowId xmlns:a16="http://schemas.microsoft.com/office/drawing/2014/main" val="10002"/>
+                    <a16:rowId xmlns="" xmlns:a16="http://schemas.microsoft.com/office/drawing/2014/main" val="10002"/>
                   </a:ext>
                 </a:extLst>
               </a:tr>
@@ -10787,14 +11255,14 @@
                 <a:gridCol w="3778250">
                   <a:extLst>
                     <a:ext uri="{9D8B030D-6E8A-4147-A177-3AD203B41FA5}">
-                      <a16:colId xmlns:a16="http://schemas.microsoft.com/office/drawing/2014/main" val="20000"/>
+                      <a16:colId xmlns="" xmlns:a16="http://schemas.microsoft.com/office/drawing/2014/main" val="20000"/>
                     </a:ext>
                   </a:extLst>
                 </a:gridCol>
                 <a:gridCol w="3778250">
                   <a:extLst>
                     <a:ext uri="{9D8B030D-6E8A-4147-A177-3AD203B41FA5}">
-                      <a16:colId xmlns:a16="http://schemas.microsoft.com/office/drawing/2014/main" val="20001"/>
+                      <a16:colId xmlns="" xmlns:a16="http://schemas.microsoft.com/office/drawing/2014/main" val="20001"/>
                     </a:ext>
                   </a:extLst>
                 </a:gridCol>
@@ -10837,7 +11305,7 @@
                 </a:tc>
                 <a:extLst>
                   <a:ext uri="{0D108BD9-81ED-4DB2-BD59-A6C34878D82A}">
-                    <a16:rowId xmlns:a16="http://schemas.microsoft.com/office/drawing/2014/main" val="10000"/>
+                    <a16:rowId xmlns="" xmlns:a16="http://schemas.microsoft.com/office/drawing/2014/main" val="10000"/>
                   </a:ext>
                 </a:extLst>
               </a:tr>
@@ -12298,7 +12766,7 @@
                 </a:tc>
                 <a:extLst>
                   <a:ext uri="{0D108BD9-81ED-4DB2-BD59-A6C34878D82A}">
-                    <a16:rowId xmlns:a16="http://schemas.microsoft.com/office/drawing/2014/main" val="10001"/>
+                    <a16:rowId xmlns="" xmlns:a16="http://schemas.microsoft.com/office/drawing/2014/main" val="10001"/>
                   </a:ext>
                 </a:extLst>
               </a:tr>
@@ -12471,7 +12939,7 @@
                 </a:tc>
                 <a:extLst>
                   <a:ext uri="{0D108BD9-81ED-4DB2-BD59-A6C34878D82A}">
-                    <a16:rowId xmlns:a16="http://schemas.microsoft.com/office/drawing/2014/main" val="10002"/>
+                    <a16:rowId xmlns="" xmlns:a16="http://schemas.microsoft.com/office/drawing/2014/main" val="10002"/>
                   </a:ext>
                 </a:extLst>
               </a:tr>
@@ -12569,14 +13037,14 @@
                 <a:gridCol w="3778250">
                   <a:extLst>
                     <a:ext uri="{9D8B030D-6E8A-4147-A177-3AD203B41FA5}">
-                      <a16:colId xmlns:a16="http://schemas.microsoft.com/office/drawing/2014/main" val="20000"/>
+                      <a16:colId xmlns="" xmlns:a16="http://schemas.microsoft.com/office/drawing/2014/main" val="20000"/>
                     </a:ext>
                   </a:extLst>
                 </a:gridCol>
                 <a:gridCol w="3778250">
                   <a:extLst>
                     <a:ext uri="{9D8B030D-6E8A-4147-A177-3AD203B41FA5}">
-                      <a16:colId xmlns:a16="http://schemas.microsoft.com/office/drawing/2014/main" val="20001"/>
+                      <a16:colId xmlns="" xmlns:a16="http://schemas.microsoft.com/office/drawing/2014/main" val="20001"/>
                     </a:ext>
                   </a:extLst>
                 </a:gridCol>
@@ -12617,7 +13085,7 @@
                 </a:tc>
                 <a:extLst>
                   <a:ext uri="{0D108BD9-81ED-4DB2-BD59-A6C34878D82A}">
-                    <a16:rowId xmlns:a16="http://schemas.microsoft.com/office/drawing/2014/main" val="10000"/>
+                    <a16:rowId xmlns="" xmlns:a16="http://schemas.microsoft.com/office/drawing/2014/main" val="10000"/>
                   </a:ext>
                 </a:extLst>
               </a:tr>
@@ -13791,7 +14259,7 @@
                 </a:tc>
                 <a:extLst>
                   <a:ext uri="{0D108BD9-81ED-4DB2-BD59-A6C34878D82A}">
-                    <a16:rowId xmlns:a16="http://schemas.microsoft.com/office/drawing/2014/main" val="10001"/>
+                    <a16:rowId xmlns="" xmlns:a16="http://schemas.microsoft.com/office/drawing/2014/main" val="10001"/>
                   </a:ext>
                 </a:extLst>
               </a:tr>
@@ -13975,7 +14443,7 @@
                 </a:tc>
                 <a:extLst>
                   <a:ext uri="{0D108BD9-81ED-4DB2-BD59-A6C34878D82A}">
-                    <a16:rowId xmlns:a16="http://schemas.microsoft.com/office/drawing/2014/main" val="10002"/>
+                    <a16:rowId xmlns="" xmlns:a16="http://schemas.microsoft.com/office/drawing/2014/main" val="10002"/>
                   </a:ext>
                 </a:extLst>
               </a:tr>
@@ -14052,7 +14520,11 @@
             <a:graphicFrameLocks noGrp="1"/>
           </p:cNvGraphicFramePr>
           <p:nvPr>
-            <p:extLst/>
+            <p:extLst>
+              <p:ext uri="{D42A27DB-BD31-4B8C-83A1-F6EECF244321}">
+                <p14:modId xmlns:p14="http://schemas.microsoft.com/office/powerpoint/2010/main" val="999890961"/>
+              </p:ext>
+            </p:extLst>
           </p:nvPr>
         </p:nvGraphicFramePr>
         <p:xfrm>
@@ -14069,7 +14541,7 @@
                 <a:gridCol w="7556500">
                   <a:extLst>
                     <a:ext uri="{9D8B030D-6E8A-4147-A177-3AD203B41FA5}">
-                      <a16:colId xmlns:a16="http://schemas.microsoft.com/office/drawing/2014/main" val="20000"/>
+                      <a16:colId xmlns="" xmlns:a16="http://schemas.microsoft.com/office/drawing/2014/main" val="20000"/>
                     </a:ext>
                   </a:extLst>
                 </a:gridCol>
@@ -14102,7 +14574,7 @@
                 </a:tc>
                 <a:extLst>
                   <a:ext uri="{0D108BD9-81ED-4DB2-BD59-A6C34878D82A}">
-                    <a16:rowId xmlns:a16="http://schemas.microsoft.com/office/drawing/2014/main" val="10000"/>
+                    <a16:rowId xmlns="" xmlns:a16="http://schemas.microsoft.com/office/drawing/2014/main" val="10000"/>
                   </a:ext>
                 </a:extLst>
               </a:tr>
@@ -14440,7 +14912,7 @@
                         <a:defRPr/>
                       </a:pPr>
                       <a:r>
-                        <a:rPr lang="en-US" sz="1200" dirty="0" err="1">
+                        <a:rPr lang="en-US" sz="1200" dirty="0" err="1" smtClean="0">
                           <a:latin typeface="Malgun Gothic" charset="-127"/>
                           <a:ea typeface="Malgun Gothic" charset="-127"/>
                           <a:cs typeface="Malgun Gothic" charset="-127"/>
@@ -14448,7 +14920,7 @@
                         <a:t>JScrollPane</a:t>
                       </a:r>
                       <a:r>
-                        <a:rPr lang="en-US" sz="1200" dirty="0">
+                        <a:rPr lang="en-US" sz="1200" dirty="0" smtClean="0">
                           <a:latin typeface="Malgun Gothic" charset="-127"/>
                           <a:ea typeface="Malgun Gothic" charset="-127"/>
                           <a:cs typeface="Malgun Gothic" charset="-127"/>
@@ -14456,33 +14928,19 @@
                         <a:t> </a:t>
                       </a:r>
                       <a:r>
-                        <a:rPr lang="en-US" sz="1200" dirty="0" err="1">
+                        <a:rPr lang="en-US" sz="1200" dirty="0" err="1" smtClean="0">
                           <a:latin typeface="Malgun Gothic" charset="-127"/>
                           <a:ea typeface="Malgun Gothic" charset="-127"/>
                           <a:cs typeface="Malgun Gothic" charset="-127"/>
                         </a:rPr>
                         <a:t>scrollPane</a:t>
                       </a:r>
-                      <a:endParaRPr lang="en-US" sz="1200" dirty="0">
+                      <a:endParaRPr lang="en-US" sz="1200" dirty="0" smtClean="0">
                         <a:latin typeface="Malgun Gothic" charset="-127"/>
                         <a:ea typeface="Malgun Gothic" charset="-127"/>
                         <a:cs typeface="Malgun Gothic" charset="-127"/>
                       </a:endParaRPr>
                     </a:p>
-                  </a:txBody>
-                  <a:tcPr/>
-                </a:tc>
-                <a:extLst>
-                  <a:ext uri="{0D108BD9-81ED-4DB2-BD59-A6C34878D82A}">
-                    <a16:rowId xmlns:a16="http://schemas.microsoft.com/office/drawing/2014/main" val="10001"/>
-                  </a:ext>
-                </a:extLst>
-              </a:tr>
-              <a:tr h="2290108">
-                <a:tc>
-                  <a:txBody>
-                    <a:bodyPr/>
-                    <a:lstStyle/>
                     <a:p>
                       <a:pPr marL="0" marR="0" indent="0" algn="l" defTabSz="914400" rtl="0" eaLnBrk="1" fontAlgn="auto" latinLnBrk="1" hangingPunct="1">
                         <a:lnSpc>
@@ -14502,45 +14960,34 @@
                         <a:defRPr/>
                       </a:pPr>
                       <a:r>
-                        <a:rPr lang="en-US" sz="1200" dirty="0">
-                          <a:latin typeface="Malgun Gothic" charset="-127"/>
-                          <a:ea typeface="Malgun Gothic" charset="-127"/>
-                          <a:cs typeface="Malgun Gothic" charset="-127"/>
-                        </a:rPr>
-                        <a:t>public </a:t>
-                      </a:r>
-                      <a:r>
-                        <a:rPr lang="en-US" sz="1200" dirty="0" err="1">
-                          <a:latin typeface="Malgun Gothic" charset="-127"/>
-                          <a:ea typeface="Malgun Gothic" charset="-127"/>
-                          <a:cs typeface="Malgun Gothic" charset="-127"/>
-                        </a:rPr>
-                        <a:t>TodoManage</a:t>
-                      </a:r>
-                      <a:r>
-                        <a:rPr lang="en-US" sz="1200" dirty="0">
-                          <a:latin typeface="Malgun Gothic" charset="-127"/>
-                          <a:ea typeface="Malgun Gothic" charset="-127"/>
-                          <a:cs typeface="Malgun Gothic" charset="-127"/>
-                        </a:rPr>
-                        <a:t>(Intro </a:t>
-                      </a:r>
-                      <a:r>
-                        <a:rPr lang="en-US" sz="1200" dirty="0" err="1">
-                          <a:latin typeface="Malgun Gothic" charset="-127"/>
-                          <a:ea typeface="Malgun Gothic" charset="-127"/>
-                          <a:cs typeface="Malgun Gothic" charset="-127"/>
-                        </a:rPr>
-                        <a:t>introclass_parm</a:t>
-                      </a:r>
-                      <a:r>
-                        <a:rPr lang="en-US" sz="1200" dirty="0">
-                          <a:latin typeface="Malgun Gothic" charset="-127"/>
-                          <a:ea typeface="Malgun Gothic" charset="-127"/>
-                          <a:cs typeface="Malgun Gothic" charset="-127"/>
-                        </a:rPr>
-                        <a:t>)</a:t>
-                      </a:r>
+                        <a:rPr lang="en-US" sz="1200" dirty="0" err="1" smtClean="0">
+                          <a:latin typeface="Malgun Gothic" charset="-127"/>
+                          <a:ea typeface="Malgun Gothic" charset="-127"/>
+                          <a:cs typeface="Malgun Gothic" charset="-127"/>
+                        </a:rPr>
+                        <a:t>JButton</a:t>
+                      </a:r>
+                      <a:r>
+                        <a:rPr lang="en-US" sz="1200" dirty="0" smtClean="0">
+                          <a:latin typeface="Malgun Gothic" charset="-127"/>
+                          <a:ea typeface="Malgun Gothic" charset="-127"/>
+                          <a:cs typeface="Malgun Gothic" charset="-127"/>
+                        </a:rPr>
+                        <a:t> </a:t>
+                      </a:r>
+                      <a:r>
+                        <a:rPr lang="en-US" sz="1200" dirty="0" err="1" smtClean="0">
+                          <a:latin typeface="Malgun Gothic" charset="-127"/>
+                          <a:ea typeface="Malgun Gothic" charset="-127"/>
+                          <a:cs typeface="Malgun Gothic" charset="-127"/>
+                        </a:rPr>
+                        <a:t>btnHideShowCompleted</a:t>
+                      </a:r>
+                      <a:endParaRPr lang="en-US" sz="1200" dirty="0" smtClean="0">
+                        <a:latin typeface="Malgun Gothic" charset="-127"/>
+                        <a:ea typeface="Malgun Gothic" charset="-127"/>
+                        <a:cs typeface="Malgun Gothic" charset="-127"/>
+                      </a:endParaRPr>
                     </a:p>
                     <a:p>
                       <a:pPr marL="0" marR="0" indent="0" algn="l" defTabSz="914400" rtl="0" eaLnBrk="1" fontAlgn="auto" latinLnBrk="1" hangingPunct="1">
@@ -14560,47 +15007,26 @@
                         <a:tabLst/>
                         <a:defRPr/>
                       </a:pPr>
-                      <a:r>
-                        <a:rPr lang="en-US" sz="1200" dirty="0">
-                          <a:latin typeface="Malgun Gothic" charset="-127"/>
-                          <a:ea typeface="Malgun Gothic" charset="-127"/>
-                          <a:cs typeface="Malgun Gothic" charset="-127"/>
-                        </a:rPr>
-                        <a:t>public void </a:t>
-                      </a:r>
-                      <a:r>
-                        <a:rPr lang="en-US" sz="1200" dirty="0" err="1">
-                          <a:latin typeface="Malgun Gothic" charset="-127"/>
-                          <a:ea typeface="Malgun Gothic" charset="-127"/>
-                          <a:cs typeface="Malgun Gothic" charset="-127"/>
-                        </a:rPr>
-                        <a:t>actionPerformed</a:t>
-                      </a:r>
-                      <a:r>
-                        <a:rPr lang="en-US" sz="1200" dirty="0">
-                          <a:latin typeface="Malgun Gothic" charset="-127"/>
-                          <a:ea typeface="Malgun Gothic" charset="-127"/>
-                          <a:cs typeface="Malgun Gothic" charset="-127"/>
-                        </a:rPr>
-                        <a:t>(</a:t>
-                      </a:r>
-                      <a:r>
-                        <a:rPr lang="en-US" sz="1200" dirty="0" err="1">
-                          <a:latin typeface="Malgun Gothic" charset="-127"/>
-                          <a:ea typeface="Malgun Gothic" charset="-127"/>
-                          <a:cs typeface="Malgun Gothic" charset="-127"/>
-                        </a:rPr>
-                        <a:t>ActionEvent</a:t>
-                      </a:r>
-                      <a:r>
-                        <a:rPr lang="en-US" sz="1200" baseline="0" dirty="0">
-                          <a:latin typeface="Malgun Gothic" charset="-127"/>
-                          <a:ea typeface="Malgun Gothic" charset="-127"/>
-                          <a:cs typeface="Malgun Gothic" charset="-127"/>
-                        </a:rPr>
-                        <a:t> e)</a:t>
-                      </a:r>
-                    </a:p>
+                      <a:endParaRPr lang="en-US" sz="1200" dirty="0">
+                        <a:latin typeface="Malgun Gothic" charset="-127"/>
+                        <a:ea typeface="Malgun Gothic" charset="-127"/>
+                        <a:cs typeface="Malgun Gothic" charset="-127"/>
+                      </a:endParaRPr>
+                    </a:p>
+                  </a:txBody>
+                  <a:tcPr/>
+                </a:tc>
+                <a:extLst>
+                  <a:ext uri="{0D108BD9-81ED-4DB2-BD59-A6C34878D82A}">
+                    <a16:rowId xmlns="" xmlns:a16="http://schemas.microsoft.com/office/drawing/2014/main" val="10001"/>
+                  </a:ext>
+                </a:extLst>
+              </a:tr>
+              <a:tr h="2290108">
+                <a:tc>
+                  <a:txBody>
+                    <a:bodyPr/>
+                    <a:lstStyle/>
                     <a:p>
                       <a:pPr marL="0" marR="0" indent="0" algn="l" defTabSz="914400" rtl="0" eaLnBrk="1" fontAlgn="auto" latinLnBrk="1" hangingPunct="1">
                         <a:lnSpc>
@@ -14619,6 +15045,204 @@
                         <a:tabLst/>
                         <a:defRPr/>
                       </a:pPr>
+                      <a:r>
+                        <a:rPr lang="en-US" sz="1200" dirty="0">
+                          <a:latin typeface="Malgun Gothic" charset="-127"/>
+                          <a:ea typeface="Malgun Gothic" charset="-127"/>
+                          <a:cs typeface="Malgun Gothic" charset="-127"/>
+                        </a:rPr>
+                        <a:t>public </a:t>
+                      </a:r>
+                      <a:r>
+                        <a:rPr lang="en-US" sz="1200" dirty="0" err="1">
+                          <a:latin typeface="Malgun Gothic" charset="-127"/>
+                          <a:ea typeface="Malgun Gothic" charset="-127"/>
+                          <a:cs typeface="Malgun Gothic" charset="-127"/>
+                        </a:rPr>
+                        <a:t>TodoManage</a:t>
+                      </a:r>
+                      <a:r>
+                        <a:rPr lang="en-US" sz="1200" dirty="0">
+                          <a:latin typeface="Malgun Gothic" charset="-127"/>
+                          <a:ea typeface="Malgun Gothic" charset="-127"/>
+                          <a:cs typeface="Malgun Gothic" charset="-127"/>
+                        </a:rPr>
+                        <a:t>(Intro </a:t>
+                      </a:r>
+                      <a:r>
+                        <a:rPr lang="en-US" sz="1200" dirty="0" err="1">
+                          <a:latin typeface="Malgun Gothic" charset="-127"/>
+                          <a:ea typeface="Malgun Gothic" charset="-127"/>
+                          <a:cs typeface="Malgun Gothic" charset="-127"/>
+                        </a:rPr>
+                        <a:t>introclass_parm</a:t>
+                      </a:r>
+                      <a:r>
+                        <a:rPr lang="en-US" sz="1200" dirty="0">
+                          <a:latin typeface="Malgun Gothic" charset="-127"/>
+                          <a:ea typeface="Malgun Gothic" charset="-127"/>
+                          <a:cs typeface="Malgun Gothic" charset="-127"/>
+                        </a:rPr>
+                        <a:t>)</a:t>
+                      </a:r>
+                    </a:p>
+                    <a:p>
+                      <a:pPr marL="0" marR="0" indent="0" algn="l" defTabSz="914400" rtl="0" eaLnBrk="1" fontAlgn="auto" latinLnBrk="1" hangingPunct="1">
+                        <a:lnSpc>
+                          <a:spcPct val="100000"/>
+                        </a:lnSpc>
+                        <a:spcBef>
+                          <a:spcPts val="0"/>
+                        </a:spcBef>
+                        <a:spcAft>
+                          <a:spcPts val="0"/>
+                        </a:spcAft>
+                        <a:buClrTx/>
+                        <a:buSzTx/>
+                        <a:buFontTx/>
+                        <a:buNone/>
+                        <a:tabLst/>
+                        <a:defRPr/>
+                      </a:pPr>
+                      <a:r>
+                        <a:rPr lang="en-US" sz="1200" dirty="0">
+                          <a:latin typeface="Malgun Gothic" charset="-127"/>
+                          <a:ea typeface="Malgun Gothic" charset="-127"/>
+                          <a:cs typeface="Malgun Gothic" charset="-127"/>
+                        </a:rPr>
+                        <a:t>public void </a:t>
+                      </a:r>
+                      <a:r>
+                        <a:rPr lang="en-US" sz="1200" dirty="0" err="1">
+                          <a:latin typeface="Malgun Gothic" charset="-127"/>
+                          <a:ea typeface="Malgun Gothic" charset="-127"/>
+                          <a:cs typeface="Malgun Gothic" charset="-127"/>
+                        </a:rPr>
+                        <a:t>actionPerformed</a:t>
+                      </a:r>
+                      <a:r>
+                        <a:rPr lang="en-US" sz="1200" dirty="0">
+                          <a:latin typeface="Malgun Gothic" charset="-127"/>
+                          <a:ea typeface="Malgun Gothic" charset="-127"/>
+                          <a:cs typeface="Malgun Gothic" charset="-127"/>
+                        </a:rPr>
+                        <a:t>(</a:t>
+                      </a:r>
+                      <a:r>
+                        <a:rPr lang="en-US" sz="1200" dirty="0" err="1">
+                          <a:latin typeface="Malgun Gothic" charset="-127"/>
+                          <a:ea typeface="Malgun Gothic" charset="-127"/>
+                          <a:cs typeface="Malgun Gothic" charset="-127"/>
+                        </a:rPr>
+                        <a:t>ActionEvent</a:t>
+                      </a:r>
+                      <a:r>
+                        <a:rPr lang="en-US" sz="1200" baseline="0" dirty="0">
+                          <a:latin typeface="Malgun Gothic" charset="-127"/>
+                          <a:ea typeface="Malgun Gothic" charset="-127"/>
+                          <a:cs typeface="Malgun Gothic" charset="-127"/>
+                        </a:rPr>
+                        <a:t> e</a:t>
+                      </a:r>
+                      <a:r>
+                        <a:rPr lang="en-US" sz="1200" baseline="0" dirty="0" smtClean="0">
+                          <a:latin typeface="Malgun Gothic" charset="-127"/>
+                          <a:ea typeface="Malgun Gothic" charset="-127"/>
+                          <a:cs typeface="Malgun Gothic" charset="-127"/>
+                        </a:rPr>
+                        <a:t>)</a:t>
+                      </a:r>
+                    </a:p>
+                    <a:p>
+                      <a:pPr marL="0" marR="0" indent="0" algn="l" defTabSz="914400" rtl="0" eaLnBrk="1" fontAlgn="auto" latinLnBrk="1" hangingPunct="1">
+                        <a:lnSpc>
+                          <a:spcPct val="100000"/>
+                        </a:lnSpc>
+                        <a:spcBef>
+                          <a:spcPts val="0"/>
+                        </a:spcBef>
+                        <a:spcAft>
+                          <a:spcPts val="0"/>
+                        </a:spcAft>
+                        <a:buClrTx/>
+                        <a:buSzTx/>
+                        <a:buFontTx/>
+                        <a:buNone/>
+                        <a:tabLst/>
+                        <a:defRPr/>
+                      </a:pPr>
+                      <a:r>
+                        <a:rPr lang="en-US" sz="1200" baseline="0" dirty="0" smtClean="0">
+                          <a:latin typeface="Malgun Gothic" charset="-127"/>
+                          <a:ea typeface="Malgun Gothic" charset="-127"/>
+                          <a:cs typeface="Malgun Gothic" charset="-127"/>
+                        </a:rPr>
+                        <a:t>public void </a:t>
+                      </a:r>
+                      <a:r>
+                        <a:rPr lang="en-US" sz="1200" baseline="0" dirty="0" err="1" smtClean="0">
+                          <a:latin typeface="Malgun Gothic" charset="-127"/>
+                          <a:ea typeface="Malgun Gothic" charset="-127"/>
+                          <a:cs typeface="Malgun Gothic" charset="-127"/>
+                        </a:rPr>
+                        <a:t>UpdateTable_HideShowCompleted</a:t>
+                      </a:r>
+                      <a:r>
+                        <a:rPr lang="en-US" sz="1200" baseline="0" dirty="0" smtClean="0">
+                          <a:latin typeface="Malgun Gothic" charset="-127"/>
+                          <a:ea typeface="Malgun Gothic" charset="-127"/>
+                          <a:cs typeface="Malgun Gothic" charset="-127"/>
+                        </a:rPr>
+                        <a:t>()</a:t>
+                      </a:r>
+                      <a:endParaRPr lang="en-US" sz="1200" baseline="0" dirty="0">
+                        <a:latin typeface="Malgun Gothic" charset="-127"/>
+                        <a:ea typeface="Malgun Gothic" charset="-127"/>
+                        <a:cs typeface="Malgun Gothic" charset="-127"/>
+                      </a:endParaRPr>
+                    </a:p>
+                    <a:p>
+                      <a:pPr marL="0" marR="0" indent="0" algn="l" defTabSz="914400" rtl="0" eaLnBrk="1" fontAlgn="auto" latinLnBrk="1" hangingPunct="1">
+                        <a:lnSpc>
+                          <a:spcPct val="100000"/>
+                        </a:lnSpc>
+                        <a:spcBef>
+                          <a:spcPts val="0"/>
+                        </a:spcBef>
+                        <a:spcAft>
+                          <a:spcPts val="0"/>
+                        </a:spcAft>
+                        <a:buClrTx/>
+                        <a:buSzTx/>
+                        <a:buFontTx/>
+                        <a:buNone/>
+                        <a:tabLst/>
+                        <a:defRPr/>
+                      </a:pPr>
+                      <a:r>
+                        <a:rPr lang="en-US" sz="1200" baseline="0" dirty="0" smtClean="0">
+                          <a:latin typeface="Malgun Gothic" charset="-127"/>
+                          <a:ea typeface="Malgun Gothic" charset="-127"/>
+                          <a:cs typeface="Malgun Gothic" charset="-127"/>
+                        </a:rPr>
+                        <a:t>public void </a:t>
+                      </a:r>
+                      <a:r>
+                        <a:rPr lang="en-US" sz="1200" baseline="0" dirty="0" err="1" smtClean="0">
+                          <a:latin typeface="Malgun Gothic" charset="-127"/>
+                          <a:ea typeface="Malgun Gothic" charset="-127"/>
+                          <a:cs typeface="Malgun Gothic" charset="-127"/>
+                        </a:rPr>
+                        <a:t>SelectUpdateTableMethod</a:t>
+                      </a:r>
+                      <a:r>
+                        <a:rPr lang="en-US" sz="1200" baseline="0" dirty="0" smtClean="0">
+                          <a:latin typeface="Malgun Gothic" charset="-127"/>
+                          <a:ea typeface="Malgun Gothic" charset="-127"/>
+                          <a:cs typeface="Malgun Gothic" charset="-127"/>
+                        </a:rPr>
+                        <a:t>()</a:t>
+                      </a:r>
                       <a:endParaRPr lang="en-US" sz="1200" baseline="0" dirty="0">
                         <a:latin typeface="Malgun Gothic" charset="-127"/>
                         <a:ea typeface="Malgun Gothic" charset="-127"/>
@@ -14630,7 +15254,7 @@
                 </a:tc>
                 <a:extLst>
                   <a:ext uri="{0D108BD9-81ED-4DB2-BD59-A6C34878D82A}">
-                    <a16:rowId xmlns:a16="http://schemas.microsoft.com/office/drawing/2014/main" val="10002"/>
+                    <a16:rowId xmlns="" xmlns:a16="http://schemas.microsoft.com/office/drawing/2014/main" val="10002"/>
                   </a:ext>
                 </a:extLst>
               </a:tr>
@@ -14728,14 +15352,14 @@
                 <a:gridCol w="3778250">
                   <a:extLst>
                     <a:ext uri="{9D8B030D-6E8A-4147-A177-3AD203B41FA5}">
-                      <a16:colId xmlns:a16="http://schemas.microsoft.com/office/drawing/2014/main" val="20000"/>
+                      <a16:colId xmlns="" xmlns:a16="http://schemas.microsoft.com/office/drawing/2014/main" val="20000"/>
                     </a:ext>
                   </a:extLst>
                 </a:gridCol>
                 <a:gridCol w="3778250">
                   <a:extLst>
                     <a:ext uri="{9D8B030D-6E8A-4147-A177-3AD203B41FA5}">
-                      <a16:colId xmlns:a16="http://schemas.microsoft.com/office/drawing/2014/main" val="4260403839"/>
+                      <a16:colId xmlns="" xmlns:a16="http://schemas.microsoft.com/office/drawing/2014/main" val="4260403839"/>
                     </a:ext>
                   </a:extLst>
                 </a:gridCol>
@@ -14795,7 +15419,7 @@
                 </a:tc>
                 <a:extLst>
                   <a:ext uri="{0D108BD9-81ED-4DB2-BD59-A6C34878D82A}">
-                    <a16:rowId xmlns:a16="http://schemas.microsoft.com/office/drawing/2014/main" val="10000"/>
+                    <a16:rowId xmlns="" xmlns:a16="http://schemas.microsoft.com/office/drawing/2014/main" val="10000"/>
                   </a:ext>
                 </a:extLst>
               </a:tr>
@@ -15905,7 +16529,7 @@
                 </a:tc>
                 <a:extLst>
                   <a:ext uri="{0D108BD9-81ED-4DB2-BD59-A6C34878D82A}">
-                    <a16:rowId xmlns:a16="http://schemas.microsoft.com/office/drawing/2014/main" val="10001"/>
+                    <a16:rowId xmlns="" xmlns:a16="http://schemas.microsoft.com/office/drawing/2014/main" val="10001"/>
                   </a:ext>
                 </a:extLst>
               </a:tr>
@@ -16196,7 +16820,7 @@
                 </a:tc>
                 <a:extLst>
                   <a:ext uri="{0D108BD9-81ED-4DB2-BD59-A6C34878D82A}">
-                    <a16:rowId xmlns:a16="http://schemas.microsoft.com/office/drawing/2014/main" val="10002"/>
+                    <a16:rowId xmlns="" xmlns:a16="http://schemas.microsoft.com/office/drawing/2014/main" val="10002"/>
                   </a:ext>
                 </a:extLst>
               </a:tr>

</xml_diff>